<commit_message>
Weiter an Abschlusspräsentation gearbeitet.
</commit_message>
<xml_diff>
--- a/Abschlusspräsentation/SpielkonzeptFINAL.pptx
+++ b/Abschlusspräsentation/SpielkonzeptFINAL.pptx
@@ -13,16 +13,16 @@
     <p:sldId id="258" r:id="rId4"/>
     <p:sldId id="259" r:id="rId5"/>
     <p:sldId id="260" r:id="rId6"/>
-    <p:sldId id="264" r:id="rId7"/>
-    <p:sldId id="261" r:id="rId8"/>
-    <p:sldId id="262" r:id="rId9"/>
-    <p:sldId id="263" r:id="rId10"/>
-    <p:sldId id="265" r:id="rId11"/>
-    <p:sldId id="266" r:id="rId12"/>
-    <p:sldId id="267" r:id="rId13"/>
-    <p:sldId id="270" r:id="rId14"/>
-    <p:sldId id="268" r:id="rId15"/>
-    <p:sldId id="271" r:id="rId16"/>
+    <p:sldId id="272" r:id="rId7"/>
+    <p:sldId id="264" r:id="rId8"/>
+    <p:sldId id="261" r:id="rId9"/>
+    <p:sldId id="262" r:id="rId10"/>
+    <p:sldId id="263" r:id="rId11"/>
+    <p:sldId id="265" r:id="rId12"/>
+    <p:sldId id="266" r:id="rId13"/>
+    <p:sldId id="267" r:id="rId14"/>
+    <p:sldId id="270" r:id="rId15"/>
+    <p:sldId id="268" r:id="rId16"/>
   </p:sldIdLst>
   <p:sldSz cx="9144000" cy="6858000" type="screen4x3"/>
   <p:notesSz cx="6858000" cy="9144000"/>
@@ -206,7 +206,8 @@
           <a:p>
             <a:fld id="{6C8D679A-4C3F-4B31-9549-C990ADA7B7B3}" type="datetimeFigureOut">
               <a:rPr lang="en-US" smtClean="0"/>
-              <a:t>8/14/2014</a:t>
+              <a:pPr/>
+              <a:t>8/15/2014</a:t>
             </a:fld>
             <a:endParaRPr lang="en-US"/>
           </a:p>
@@ -365,6 +366,7 @@
           <a:p>
             <a:fld id="{038F293B-2B09-49A1-A37F-9244127D38DE}" type="slidenum">
               <a:rPr lang="en-US" smtClean="0"/>
+              <a:pPr/>
               <a:t>‹#›</a:t>
             </a:fld>
             <a:endParaRPr lang="en-US"/>
@@ -539,6 +541,7 @@
           <a:p>
             <a:fld id="{038F293B-2B09-49A1-A37F-9244127D38DE}" type="slidenum">
               <a:rPr lang="en-US" smtClean="0"/>
+              <a:pPr/>
               <a:t>2</a:t>
             </a:fld>
             <a:endParaRPr lang="en-US"/>
@@ -739,7 +742,8 @@
           <a:p>
             <a:fld id="{7DE78ED9-FA8B-4821-9A8D-E9D93B72894B}" type="datetime1">
               <a:rPr lang="en-US" smtClean="0"/>
-              <a:t>8/14/2014</a:t>
+              <a:pPr/>
+              <a:t>8/15/2014</a:t>
             </a:fld>
             <a:endParaRPr lang="en-US"/>
           </a:p>
@@ -785,6 +789,7 @@
           <a:p>
             <a:fld id="{6745021C-5F18-4753-8082-8C4943AC116D}" type="slidenum">
               <a:rPr lang="en-US" smtClean="0"/>
+              <a:pPr/>
               <a:t>‹#›</a:t>
             </a:fld>
             <a:endParaRPr lang="en-US"/>
@@ -913,7 +918,8 @@
           <a:p>
             <a:fld id="{FDEE3AEF-6B87-4981-B31A-51EE0768E404}" type="datetime1">
               <a:rPr lang="en-US" smtClean="0"/>
-              <a:t>8/14/2014</a:t>
+              <a:pPr/>
+              <a:t>8/15/2014</a:t>
             </a:fld>
             <a:endParaRPr lang="en-US"/>
           </a:p>
@@ -959,6 +965,7 @@
           <a:p>
             <a:fld id="{6745021C-5F18-4753-8082-8C4943AC116D}" type="slidenum">
               <a:rPr lang="en-US" smtClean="0"/>
+              <a:pPr/>
               <a:t>‹#›</a:t>
             </a:fld>
             <a:endParaRPr lang="en-US"/>
@@ -1097,7 +1104,8 @@
           <a:p>
             <a:fld id="{D35A51C1-B616-4430-AD17-E164F838DD85}" type="datetime1">
               <a:rPr lang="en-US" smtClean="0"/>
-              <a:t>8/14/2014</a:t>
+              <a:pPr/>
+              <a:t>8/15/2014</a:t>
             </a:fld>
             <a:endParaRPr lang="en-US"/>
           </a:p>
@@ -1143,6 +1151,7 @@
           <a:p>
             <a:fld id="{6745021C-5F18-4753-8082-8C4943AC116D}" type="slidenum">
               <a:rPr lang="en-US" smtClean="0"/>
+              <a:pPr/>
               <a:t>‹#›</a:t>
             </a:fld>
             <a:endParaRPr lang="en-US"/>
@@ -1271,7 +1280,8 @@
           <a:p>
             <a:fld id="{6A0CB1FF-596A-4167-9E9F-24398217BB8E}" type="datetime1">
               <a:rPr lang="en-US" smtClean="0"/>
-              <a:t>8/14/2014</a:t>
+              <a:pPr/>
+              <a:t>8/15/2014</a:t>
             </a:fld>
             <a:endParaRPr lang="en-US"/>
           </a:p>
@@ -1317,6 +1327,7 @@
           <a:p>
             <a:fld id="{6745021C-5F18-4753-8082-8C4943AC116D}" type="slidenum">
               <a:rPr lang="en-US" smtClean="0"/>
+              <a:pPr/>
               <a:t>‹#›</a:t>
             </a:fld>
             <a:endParaRPr lang="en-US"/>
@@ -1521,7 +1532,8 @@
           <a:p>
             <a:fld id="{E53B6A07-A1F1-4423-88A0-74F9F2526806}" type="datetime1">
               <a:rPr lang="en-US" smtClean="0"/>
-              <a:t>8/14/2014</a:t>
+              <a:pPr/>
+              <a:t>8/15/2014</a:t>
             </a:fld>
             <a:endParaRPr lang="en-US"/>
           </a:p>
@@ -1567,6 +1579,7 @@
           <a:p>
             <a:fld id="{6745021C-5F18-4753-8082-8C4943AC116D}" type="slidenum">
               <a:rPr lang="en-US" smtClean="0"/>
+              <a:pPr/>
               <a:t>‹#›</a:t>
             </a:fld>
             <a:endParaRPr lang="en-US"/>
@@ -1813,7 +1826,8 @@
           <a:p>
             <a:fld id="{07CA06E5-71DE-4B9E-8B4D-783572FC6C34}" type="datetime1">
               <a:rPr lang="en-US" smtClean="0"/>
-              <a:t>8/14/2014</a:t>
+              <a:pPr/>
+              <a:t>8/15/2014</a:t>
             </a:fld>
             <a:endParaRPr lang="en-US"/>
           </a:p>
@@ -1859,6 +1873,7 @@
           <a:p>
             <a:fld id="{6745021C-5F18-4753-8082-8C4943AC116D}" type="slidenum">
               <a:rPr lang="en-US" smtClean="0"/>
+              <a:pPr/>
               <a:t>‹#›</a:t>
             </a:fld>
             <a:endParaRPr lang="en-US"/>
@@ -2239,7 +2254,8 @@
           <a:p>
             <a:fld id="{872FE14D-79A8-46E0-9FA0-BF1122279766}" type="datetime1">
               <a:rPr lang="en-US" smtClean="0"/>
-              <a:t>8/14/2014</a:t>
+              <a:pPr/>
+              <a:t>8/15/2014</a:t>
             </a:fld>
             <a:endParaRPr lang="en-US"/>
           </a:p>
@@ -2285,6 +2301,7 @@
           <a:p>
             <a:fld id="{6745021C-5F18-4753-8082-8C4943AC116D}" type="slidenum">
               <a:rPr lang="en-US" smtClean="0"/>
+              <a:pPr/>
               <a:t>‹#›</a:t>
             </a:fld>
             <a:endParaRPr lang="en-US"/>
@@ -2361,7 +2378,8 @@
           <a:p>
             <a:fld id="{1D55895C-ADF6-45D0-B6A7-2828EEECD075}" type="datetime1">
               <a:rPr lang="en-US" smtClean="0"/>
-              <a:t>8/14/2014</a:t>
+              <a:pPr/>
+              <a:t>8/15/2014</a:t>
             </a:fld>
             <a:endParaRPr lang="en-US"/>
           </a:p>
@@ -2407,6 +2425,7 @@
           <a:p>
             <a:fld id="{6745021C-5F18-4753-8082-8C4943AC116D}" type="slidenum">
               <a:rPr lang="en-US" smtClean="0"/>
+              <a:pPr/>
               <a:t>‹#›</a:t>
             </a:fld>
             <a:endParaRPr lang="en-US"/>
@@ -2460,7 +2479,8 @@
           <a:p>
             <a:fld id="{22C97497-BB50-43CD-818F-0266E7B075ED}" type="datetime1">
               <a:rPr lang="en-US" smtClean="0"/>
-              <a:t>8/14/2014</a:t>
+              <a:pPr/>
+              <a:t>8/15/2014</a:t>
             </a:fld>
             <a:endParaRPr lang="en-US"/>
           </a:p>
@@ -2506,6 +2526,7 @@
           <a:p>
             <a:fld id="{6745021C-5F18-4753-8082-8C4943AC116D}" type="slidenum">
               <a:rPr lang="en-US" smtClean="0"/>
+              <a:pPr/>
               <a:t>‹#›</a:t>
             </a:fld>
             <a:endParaRPr lang="en-US"/>
@@ -2741,7 +2762,8 @@
           <a:p>
             <a:fld id="{FD5B2064-0D07-4398-BE77-CFDCBB5DD24D}" type="datetime1">
               <a:rPr lang="en-US" smtClean="0"/>
-              <a:t>8/14/2014</a:t>
+              <a:pPr/>
+              <a:t>8/15/2014</a:t>
             </a:fld>
             <a:endParaRPr lang="en-US"/>
           </a:p>
@@ -2787,6 +2809,7 @@
           <a:p>
             <a:fld id="{6745021C-5F18-4753-8082-8C4943AC116D}" type="slidenum">
               <a:rPr lang="en-US" smtClean="0"/>
+              <a:pPr/>
               <a:t>‹#›</a:t>
             </a:fld>
             <a:endParaRPr lang="en-US"/>
@@ -2998,7 +3021,8 @@
           <a:p>
             <a:fld id="{A23FA488-4A49-4D8C-A65E-F1F29AF5C4F1}" type="datetime1">
               <a:rPr lang="en-US" smtClean="0"/>
-              <a:t>8/14/2014</a:t>
+              <a:pPr/>
+              <a:t>8/15/2014</a:t>
             </a:fld>
             <a:endParaRPr lang="en-US"/>
           </a:p>
@@ -3044,6 +3068,7 @@
           <a:p>
             <a:fld id="{6745021C-5F18-4753-8082-8C4943AC116D}" type="slidenum">
               <a:rPr lang="en-US" smtClean="0"/>
+              <a:pPr/>
               <a:t>‹#›</a:t>
             </a:fld>
             <a:endParaRPr lang="en-US"/>
@@ -3069,7 +3094,7 @@
     <p:bg>
       <p:bgPr>
         <a:blipFill dpi="0" rotWithShape="1">
-          <a:blip r:embed="rId13">
+          <a:blip r:embed="rId13" cstate="print">
             <a:alphaModFix amt="64000"/>
             <a:lum/>
           </a:blip>
@@ -3225,7 +3250,8 @@
           <a:p>
             <a:fld id="{50705CCB-25BA-454A-AD9E-677270D6AFBE}" type="datetime1">
               <a:rPr lang="en-US" smtClean="0"/>
-              <a:t>8/14/2014</a:t>
+              <a:pPr/>
+              <a:t>8/15/2014</a:t>
             </a:fld>
             <a:endParaRPr lang="en-US"/>
           </a:p>
@@ -3307,6 +3333,7 @@
           <a:p>
             <a:fld id="{6745021C-5F18-4753-8082-8C4943AC116D}" type="slidenum">
               <a:rPr lang="en-US" smtClean="0"/>
+              <a:pPr/>
               <a:t>‹#›</a:t>
             </a:fld>
             <a:endParaRPr lang="en-US"/>
@@ -3594,7 +3621,7 @@
     <p:bg>
       <p:bgPr>
         <a:blipFill dpi="0" rotWithShape="1">
-          <a:blip r:embed="rId2">
+          <a:blip r:embed="rId2" cstate="print">
             <a:lum/>
           </a:blip>
           <a:srcRect/>
@@ -3644,7 +3671,7 @@
             <a:r>
               <a:rPr lang="de-DE" sz="6000" b="1" dirty="0" smtClean="0">
                 <a:solidFill>
-                  <a:srgbClr val="955A39"/>
+                  <a:srgbClr val="7030A0"/>
                 </a:solidFill>
                 <a:effectLst>
                   <a:outerShdw blurRad="38100" dist="38100" dir="2700000" algn="tl">
@@ -3659,7 +3686,7 @@
             </a:r>
             <a:endParaRPr lang="en-US" sz="6000" b="1" dirty="0">
               <a:solidFill>
-                <a:srgbClr val="955A39"/>
+                <a:srgbClr val="7030A0"/>
               </a:solidFill>
               <a:effectLst>
                 <a:outerShdw blurRad="38100" dist="38100" dir="2700000" algn="tl">
@@ -3685,7 +3712,7 @@
         </p:nvSpPr>
         <p:spPr>
           <a:xfrm>
-            <a:off x="1331640" y="1556792"/>
+            <a:off x="1331640" y="1484784"/>
             <a:ext cx="6400800" cy="1752600"/>
           </a:xfrm>
         </p:spPr>
@@ -3698,9 +3725,7 @@
             <a:r>
               <a:rPr lang="de-DE" sz="6000" dirty="0" smtClean="0">
                 <a:solidFill>
-                  <a:schemeClr val="accent5">
-                    <a:lumMod val="75000"/>
-                  </a:schemeClr>
+                  <a:srgbClr val="0070C0"/>
                 </a:solidFill>
                 <a:effectLst>
                   <a:outerShdw blurRad="38100" dist="38100" dir="2700000" algn="tl">
@@ -3774,10 +3799,173 @@
 <file path=ppt/slides/slide10.xml><?xml version="1.0" encoding="utf-8"?>
 <p:sld xmlns:a="http://schemas.openxmlformats.org/drawingml/2006/main" xmlns:r="http://schemas.openxmlformats.org/officeDocument/2006/relationships" xmlns:p="http://schemas.openxmlformats.org/presentationml/2006/main">
   <p:cSld>
+    <p:spTree>
+      <p:nvGrpSpPr>
+        <p:cNvPr id="1" name=""/>
+        <p:cNvGrpSpPr/>
+        <p:nvPr/>
+      </p:nvGrpSpPr>
+      <p:grpSpPr>
+        <a:xfrm>
+          <a:off x="0" y="0"/>
+          <a:ext cx="0" cy="0"/>
+          <a:chOff x="0" y="0"/>
+          <a:chExt cx="0" cy="0"/>
+        </a:xfrm>
+      </p:grpSpPr>
+      <p:sp>
+        <p:nvSpPr>
+          <p:cNvPr id="2" name="Title 1"/>
+          <p:cNvSpPr>
+            <a:spLocks noGrp="1"/>
+          </p:cNvSpPr>
+          <p:nvPr>
+            <p:ph type="title"/>
+          </p:nvPr>
+        </p:nvSpPr>
+        <p:spPr/>
+        <p:txBody>
+          <a:bodyPr/>
+          <a:lstStyle/>
+          <a:p>
+            <a:r>
+              <a:rPr lang="de-DE" dirty="0" smtClean="0"/>
+              <a:t>Der Zentralcomputer:</a:t>
+            </a:r>
+            <a:endParaRPr lang="en-US" dirty="0"/>
+          </a:p>
+        </p:txBody>
+      </p:sp>
+      <p:sp>
+        <p:nvSpPr>
+          <p:cNvPr id="3" name="Content Placeholder 2"/>
+          <p:cNvSpPr>
+            <a:spLocks noGrp="1"/>
+          </p:cNvSpPr>
+          <p:nvPr>
+            <p:ph idx="1"/>
+          </p:nvPr>
+        </p:nvSpPr>
+        <p:spPr/>
+        <p:txBody>
+          <a:bodyPr/>
+          <a:lstStyle/>
+          <a:p>
+            <a:r>
+              <a:rPr lang="de-DE" dirty="0" smtClean="0"/>
+              <a:t>Herzstück der Raumstation</a:t>
+            </a:r>
+          </a:p>
+          <a:p>
+            <a:r>
+              <a:rPr lang="de-DE" dirty="0" smtClean="0"/>
+              <a:t>Übersicht über den Zustand der Station</a:t>
+            </a:r>
+            <a:r>
+              <a:rPr lang="en-US" dirty="0" smtClean="0"/>
+              <a:t> und die </a:t>
+            </a:r>
+            <a:r>
+              <a:rPr lang="en-US" dirty="0" err="1" smtClean="0"/>
+              <a:t>Besatzung</a:t>
+            </a:r>
+            <a:endParaRPr lang="en-US" dirty="0" smtClean="0"/>
+          </a:p>
+          <a:p>
+            <a:r>
+              <a:rPr lang="de-DE" dirty="0" smtClean="0"/>
+              <a:t>Hat Kontrolle über die Position der Ringe</a:t>
+            </a:r>
+            <a:endParaRPr lang="en-US" dirty="0" smtClean="0"/>
+          </a:p>
+          <a:p>
+            <a:r>
+              <a:rPr lang="de-DE" dirty="0" smtClean="0"/>
+              <a:t>Terminals auf der Station verteilt: </a:t>
+            </a:r>
+          </a:p>
+          <a:p>
+            <a:pPr lvl="1"/>
+            <a:r>
+              <a:rPr lang="de-DE" dirty="0" smtClean="0"/>
+              <a:t>Zeigen den Astronauten an, wie die Ringe stehen</a:t>
+            </a:r>
+          </a:p>
+          <a:p>
+            <a:pPr marL="457200" lvl="1" indent="0">
+              <a:buNone/>
+            </a:pPr>
+            <a:endParaRPr lang="de-DE" dirty="0"/>
+          </a:p>
+        </p:txBody>
+      </p:sp>
+      <p:sp>
+        <p:nvSpPr>
+          <p:cNvPr id="4" name="Footer Placeholder 3"/>
+          <p:cNvSpPr>
+            <a:spLocks noGrp="1"/>
+          </p:cNvSpPr>
+          <p:nvPr>
+            <p:ph type="ftr" sz="quarter" idx="11"/>
+          </p:nvPr>
+        </p:nvSpPr>
+        <p:spPr/>
+        <p:txBody>
+          <a:bodyPr/>
+          <a:lstStyle/>
+          <a:p>
+            <a:r>
+              <a:rPr lang="en-US" smtClean="0"/>
+              <a:t>Projektseminar GameLab 2014</a:t>
+            </a:r>
+            <a:endParaRPr lang="en-US"/>
+          </a:p>
+        </p:txBody>
+      </p:sp>
+      <p:sp>
+        <p:nvSpPr>
+          <p:cNvPr id="5" name="Slide Number Placeholder 4"/>
+          <p:cNvSpPr>
+            <a:spLocks noGrp="1"/>
+          </p:cNvSpPr>
+          <p:nvPr>
+            <p:ph type="sldNum" sz="quarter" idx="12"/>
+          </p:nvPr>
+        </p:nvSpPr>
+        <p:spPr/>
+        <p:txBody>
+          <a:bodyPr/>
+          <a:lstStyle/>
+          <a:p>
+            <a:fld id="{6745021C-5F18-4753-8082-8C4943AC116D}" type="slidenum">
+              <a:rPr lang="en-US" smtClean="0"/>
+              <a:pPr/>
+              <a:t>10</a:t>
+            </a:fld>
+            <a:endParaRPr lang="en-US"/>
+          </a:p>
+        </p:txBody>
+      </p:sp>
+    </p:spTree>
+    <p:extLst>
+      <p:ext uri="{BB962C8B-B14F-4D97-AF65-F5344CB8AC3E}">
+        <p14:creationId xmlns:p14="http://schemas.microsoft.com/office/powerpoint/2010/main" val="1527997353"/>
+      </p:ext>
+    </p:extLst>
+  </p:cSld>
+  <p:clrMapOvr>
+    <a:masterClrMapping/>
+  </p:clrMapOvr>
+</p:sld>
+</file>
+
+<file path=ppt/slides/slide11.xml><?xml version="1.0" encoding="utf-8"?>
+<p:sld xmlns:a="http://schemas.openxmlformats.org/drawingml/2006/main" xmlns:r="http://schemas.openxmlformats.org/officeDocument/2006/relationships" xmlns:p="http://schemas.openxmlformats.org/presentationml/2006/main">
+  <p:cSld>
     <p:bg>
       <p:bgPr>
         <a:blipFill dpi="0" rotWithShape="1">
-          <a:blip r:embed="rId2">
+          <a:blip r:embed="rId2" cstate="print">
             <a:alphaModFix amt="64000"/>
             <a:extLst>
               <a:ext uri="{BEBA8EAE-BF5A-486C-A8C5-ECC9F3942E4B}">
@@ -3851,7 +4039,7 @@
         <p:spPr/>
         <p:txBody>
           <a:bodyPr>
-            <a:normAutofit/>
+            <a:normAutofit lnSpcReduction="10000"/>
           </a:bodyPr>
           <a:lstStyle/>
           <a:p>
@@ -3897,18 +4085,21 @@
             <a:pPr lvl="2"/>
             <a:r>
               <a:rPr lang="de-DE" dirty="0" smtClean="0"/>
-              <a:t>Verbinden von Drähten</a:t>
+              <a:t>Verbinden von Kabeln</a:t>
+            </a:r>
+          </a:p>
+          <a:p>
+            <a:pPr lvl="2"/>
+            <a:r>
+              <a:rPr lang="de-DE" dirty="0" smtClean="0"/>
+              <a:t>Entfernen von Trümmern</a:t>
             </a:r>
           </a:p>
           <a:p>
             <a:pPr lvl="1"/>
             <a:r>
               <a:rPr lang="de-DE" dirty="0" smtClean="0"/>
-              <a:t>Finden </a:t>
-            </a:r>
-            <a:r>
-              <a:rPr lang="de-DE" dirty="0" smtClean="0"/>
-              <a:t>von Gegenständen, z.B.</a:t>
+              <a:t>Finden von Gegenständen, z.B.</a:t>
             </a:r>
           </a:p>
           <a:p>
@@ -3924,6 +4115,13 @@
               <a:rPr lang="de-DE" dirty="0" smtClean="0"/>
               <a:t>Werkzeug</a:t>
             </a:r>
+          </a:p>
+          <a:p>
+            <a:pPr lvl="2"/>
+            <a:r>
+              <a:rPr lang="de-DE" dirty="0" smtClean="0"/>
+              <a:t>Accesscard….</a:t>
+            </a:r>
             <a:endParaRPr lang="de-DE" dirty="0"/>
           </a:p>
         </p:txBody>
@@ -3968,7 +4166,8 @@
           <a:p>
             <a:fld id="{6745021C-5F18-4753-8082-8C4943AC116D}" type="slidenum">
               <a:rPr lang="en-US" smtClean="0"/>
-              <a:t>10</a:t>
+              <a:pPr/>
+              <a:t>11</a:t>
             </a:fld>
             <a:endParaRPr lang="en-US"/>
           </a:p>
@@ -3987,7 +4186,7 @@
 </p:sld>
 </file>
 
-<file path=ppt/slides/slide11.xml><?xml version="1.0" encoding="utf-8"?>
+<file path=ppt/slides/slide12.xml><?xml version="1.0" encoding="utf-8"?>
 <p:sld xmlns:a="http://schemas.openxmlformats.org/drawingml/2006/main" xmlns:r="http://schemas.openxmlformats.org/officeDocument/2006/relationships" xmlns:p="http://schemas.openxmlformats.org/presentationml/2006/main">
   <p:cSld>
     <p:spTree>
@@ -4135,7 +4334,8 @@
           <a:p>
             <a:fld id="{6745021C-5F18-4753-8082-8C4943AC116D}" type="slidenum">
               <a:rPr lang="en-US" smtClean="0"/>
-              <a:t>11</a:t>
+              <a:pPr/>
+              <a:t>12</a:t>
             </a:fld>
             <a:endParaRPr lang="en-US"/>
           </a:p>
@@ -4154,13 +4354,13 @@
 </p:sld>
 </file>
 
-<file path=ppt/slides/slide12.xml><?xml version="1.0" encoding="utf-8"?>
+<file path=ppt/slides/slide13.xml><?xml version="1.0" encoding="utf-8"?>
 <p:sld xmlns:a="http://schemas.openxmlformats.org/drawingml/2006/main" xmlns:r="http://schemas.openxmlformats.org/officeDocument/2006/relationships" xmlns:p="http://schemas.openxmlformats.org/presentationml/2006/main">
   <p:cSld>
     <p:bg>
       <p:bgPr>
         <a:blipFill dpi="0" rotWithShape="1">
-          <a:blip r:embed="rId2">
+          <a:blip r:embed="rId2" cstate="print">
             <a:alphaModFix amt="64000"/>
             <a:lum/>
           </a:blip>
@@ -4224,13 +4424,13 @@
         <p:spPr/>
         <p:txBody>
           <a:bodyPr>
-            <a:normAutofit/>
+            <a:normAutofit lnSpcReduction="10000"/>
           </a:bodyPr>
           <a:lstStyle/>
           <a:p>
             <a:r>
               <a:rPr lang="de-DE" dirty="0" smtClean="0"/>
-              <a:t>Verteidigt Kommandozentrale</a:t>
+              <a:t>Verteidigt Kontrollzentrale</a:t>
             </a:r>
           </a:p>
           <a:p>
@@ -4276,7 +4476,7 @@
           <a:p>
             <a:r>
               <a:rPr lang="de-DE" dirty="0" smtClean="0"/>
-              <a:t>Stellt Strom ab, um Astronauten zu behindern</a:t>
+              <a:t>Stellt Licht in den Sektoren aus, um Astronauten zu behindern</a:t>
             </a:r>
           </a:p>
           <a:p>
@@ -4324,7 +4524,8 @@
           <a:p>
             <a:fld id="{6745021C-5F18-4753-8082-8C4943AC116D}" type="slidenum">
               <a:rPr lang="en-US" smtClean="0"/>
-              <a:t>12</a:t>
+              <a:pPr/>
+              <a:t>13</a:t>
             </a:fld>
             <a:endParaRPr lang="en-US"/>
           </a:p>
@@ -4350,13 +4551,13 @@
 </p:sld>
 </file>
 
-<file path=ppt/slides/slide13.xml><?xml version="1.0" encoding="utf-8"?>
+<file path=ppt/slides/slide14.xml><?xml version="1.0" encoding="utf-8"?>
 <p:sld xmlns:a="http://schemas.openxmlformats.org/drawingml/2006/main" xmlns:r="http://schemas.openxmlformats.org/officeDocument/2006/relationships" xmlns:p="http://schemas.openxmlformats.org/presentationml/2006/main">
   <p:cSld>
     <p:bg>
       <p:bgPr>
         <a:blipFill dpi="0" rotWithShape="1">
-          <a:blip r:embed="rId2">
+          <a:blip r:embed="rId2" cstate="print">
             <a:alphaModFix amt="64000"/>
             <a:lum/>
           </a:blip>
@@ -4423,37 +4624,67 @@
         </p:spPr>
         <p:txBody>
           <a:bodyPr>
-            <a:normAutofit fontScale="92500"/>
+            <a:normAutofit fontScale="92500" lnSpcReduction="10000"/>
           </a:bodyPr>
           <a:lstStyle/>
           <a:p>
             <a:r>
               <a:rPr lang="de-DE" dirty="0" smtClean="0"/>
-              <a:t>Kommen auf, wenn Alienboss mit den gespawnten Aliens angreift</a:t>
-            </a:r>
-          </a:p>
-          <a:p>
-            <a:r>
-              <a:rPr lang="de-DE" dirty="0" smtClean="0"/>
-              <a:t>Wenn Astronauten dicht genug an passiv eingestellte Aliens kommen</a:t>
-            </a:r>
-          </a:p>
-          <a:p>
-            <a:r>
-              <a:rPr lang="de-DE" dirty="0" smtClean="0"/>
-              <a:t>Astronauten &amp; Aliens haben Basis-Schusswaffen</a:t>
-            </a:r>
-          </a:p>
-          <a:p>
-            <a:r>
-              <a:rPr lang="de-DE" dirty="0" smtClean="0"/>
-              <a:t>Bei Einheitenverlust droppen Waffen oder Munition</a:t>
-            </a:r>
-          </a:p>
-          <a:p>
-            <a:r>
-              <a:rPr lang="de-DE" dirty="0" smtClean="0"/>
-              <a:t>Es können Waffen, Munition und Upgrades gefunden werden</a:t>
+              <a:t>Kommen auf, wenn Alienboss mit den Kampfaliens angreift</a:t>
+            </a:r>
+          </a:p>
+          <a:p>
+            <a:r>
+              <a:rPr lang="de-DE" dirty="0" smtClean="0"/>
+              <a:t>Wenn Astronauten dicht genug an passiv eingestellte Kampfaliens kommen</a:t>
+            </a:r>
+          </a:p>
+          <a:p>
+            <a:r>
+              <a:rPr lang="de-DE" dirty="0" smtClean="0"/>
+              <a:t>Aliens haben Basis-Schusswaffen</a:t>
+            </a:r>
+          </a:p>
+          <a:p>
+            <a:r>
+              <a:rPr lang="de-DE" dirty="0" smtClean="0"/>
+              <a:t>Astronauten finden Waffen </a:t>
+            </a:r>
+          </a:p>
+          <a:p>
+            <a:r>
+              <a:rPr lang="de-DE" dirty="0" smtClean="0"/>
+              <a:t>Bei Einheitenverlust von </a:t>
+            </a:r>
+            <a:r>
+              <a:rPr lang="de-DE" dirty="0" err="1" smtClean="0"/>
+              <a:t>Alienseite</a:t>
+            </a:r>
+            <a:r>
+              <a:rPr lang="de-DE" dirty="0" smtClean="0"/>
+              <a:t> </a:t>
+            </a:r>
+            <a:r>
+              <a:rPr lang="de-DE" dirty="0" err="1" smtClean="0"/>
+              <a:t>droppt</a:t>
+            </a:r>
+            <a:r>
+              <a:rPr lang="de-DE" dirty="0" smtClean="0"/>
+              <a:t> Munition/</a:t>
+            </a:r>
+            <a:r>
+              <a:rPr lang="de-DE" dirty="0" err="1" smtClean="0"/>
+              <a:t>Health</a:t>
+            </a:r>
+            <a:r>
+              <a:rPr lang="de-DE" dirty="0" smtClean="0"/>
+              <a:t> Pakete</a:t>
+            </a:r>
+          </a:p>
+          <a:p>
+            <a:r>
+              <a:rPr lang="de-DE" dirty="0" smtClean="0"/>
+              <a:t>Es können Waffen und Munition gefunden werden</a:t>
             </a:r>
           </a:p>
         </p:txBody>
@@ -4498,7 +4729,8 @@
           <a:p>
             <a:fld id="{6745021C-5F18-4753-8082-8C4943AC116D}" type="slidenum">
               <a:rPr lang="en-US" smtClean="0"/>
-              <a:t>13</a:t>
+              <a:pPr/>
+              <a:t>14</a:t>
             </a:fld>
             <a:endParaRPr lang="en-US"/>
           </a:p>
@@ -4524,7 +4756,7 @@
 </p:sld>
 </file>
 
-<file path=ppt/slides/slide14.xml><?xml version="1.0" encoding="utf-8"?>
+<file path=ppt/slides/slide15.xml><?xml version="1.0" encoding="utf-8"?>
 <p:sld xmlns:a="http://schemas.openxmlformats.org/drawingml/2006/main" xmlns:r="http://schemas.openxmlformats.org/officeDocument/2006/relationships" xmlns:p="http://schemas.openxmlformats.org/presentationml/2006/main">
   <p:cSld>
     <p:spTree>
@@ -4577,7 +4809,7 @@
         <p:spPr/>
         <p:txBody>
           <a:bodyPr>
-            <a:normAutofit lnSpcReduction="10000"/>
+            <a:normAutofit/>
           </a:bodyPr>
           <a:lstStyle/>
           <a:p>
@@ -4590,44 +4822,57 @@
             <a:pPr lvl="1"/>
             <a:r>
               <a:rPr lang="de-DE" dirty="0" smtClean="0"/>
-              <a:t>Alle Reperaturarbeiten am Schiff erledigen</a:t>
+              <a:t>Alle </a:t>
+            </a:r>
+            <a:r>
+              <a:rPr lang="de-DE" dirty="0" err="1" smtClean="0"/>
+              <a:t>Reperaturarbeiten</a:t>
+            </a:r>
+            <a:r>
+              <a:rPr lang="de-DE" dirty="0" smtClean="0"/>
+              <a:t> an der Raumstation erledigen</a:t>
             </a:r>
           </a:p>
           <a:p>
             <a:pPr lvl="1"/>
             <a:r>
               <a:rPr lang="de-DE" dirty="0" smtClean="0"/>
-              <a:t>Vernichtung des Alienbosses</a:t>
+              <a:t>Vernichtung des </a:t>
+            </a:r>
+            <a:r>
+              <a:rPr lang="de-DE" dirty="0" err="1" smtClean="0"/>
+              <a:t>Alienbosses</a:t>
+            </a:r>
+            <a:r>
+              <a:rPr lang="de-DE" dirty="0" smtClean="0"/>
+              <a:t> (Endkampf)</a:t>
             </a:r>
           </a:p>
           <a:p>
             <a:pPr lvl="1"/>
             <a:r>
               <a:rPr lang="de-DE" dirty="0" smtClean="0"/>
-              <a:t>Eroberung des Kontrollzentrums</a:t>
+              <a:t>Vernichtung der Kontrollzentrale</a:t>
+            </a:r>
+            <a:endParaRPr lang="de-DE" dirty="0"/>
+          </a:p>
+          <a:p>
+            <a:r>
+              <a:rPr lang="de-DE" dirty="0" smtClean="0"/>
+              <a:t>Alien:</a:t>
             </a:r>
           </a:p>
           <a:p>
             <a:pPr lvl="1"/>
-            <a:endParaRPr lang="de-DE" dirty="0"/>
-          </a:p>
-          <a:p>
-            <a:r>
-              <a:rPr lang="de-DE" dirty="0" smtClean="0"/>
-              <a:t>Alien:</a:t>
+            <a:r>
+              <a:rPr lang="de-DE" dirty="0" smtClean="0"/>
+              <a:t>Verhinderung der Übernahme der Kontrollzentrale</a:t>
             </a:r>
           </a:p>
           <a:p>
             <a:pPr lvl="1"/>
             <a:r>
               <a:rPr lang="de-DE" dirty="0" smtClean="0"/>
-              <a:t>Verhinderung der Übernahme des Kontrollzentrums</a:t>
-            </a:r>
-          </a:p>
-          <a:p>
-            <a:pPr lvl="1"/>
-            <a:r>
-              <a:rPr lang="de-DE" dirty="0" smtClean="0"/>
               <a:t>Vernichtung der Astronauten</a:t>
             </a:r>
           </a:p>
@@ -4673,7 +4918,8 @@
           <a:p>
             <a:fld id="{6745021C-5F18-4753-8082-8C4943AC116D}" type="slidenum">
               <a:rPr lang="en-US" smtClean="0"/>
-              <a:t>14</a:t>
+              <a:pPr/>
+              <a:t>15</a:t>
             </a:fld>
             <a:endParaRPr lang="en-US"/>
           </a:p>
@@ -4683,159 +4929,6 @@
     <p:extLst>
       <p:ext uri="{BB962C8B-B14F-4D97-AF65-F5344CB8AC3E}">
         <p14:creationId xmlns:p14="http://schemas.microsoft.com/office/powerpoint/2010/main" val="2936356492"/>
-      </p:ext>
-    </p:extLst>
-  </p:cSld>
-  <p:clrMapOvr>
-    <a:masterClrMapping/>
-  </p:clrMapOvr>
-  <p:timing>
-    <p:tnLst>
-      <p:par>
-        <p:cTn id="1" dur="indefinite" restart="never" nodeType="tmRoot"/>
-      </p:par>
-    </p:tnLst>
-  </p:timing>
-</p:sld>
-</file>
-
-<file path=ppt/slides/slide15.xml><?xml version="1.0" encoding="utf-8"?>
-<p:sld xmlns:a="http://schemas.openxmlformats.org/drawingml/2006/main" xmlns:r="http://schemas.openxmlformats.org/officeDocument/2006/relationships" xmlns:p="http://schemas.openxmlformats.org/presentationml/2006/main">
-  <p:cSld>
-    <p:bg>
-      <p:bgPr>
-        <a:blipFill dpi="0" rotWithShape="1">
-          <a:blip r:embed="rId2">
-            <a:alphaModFix amt="83000"/>
-            <a:lum/>
-          </a:blip>
-          <a:srcRect/>
-          <a:stretch>
-            <a:fillRect l="-10000" r="-10000"/>
-          </a:stretch>
-        </a:blipFill>
-        <a:effectLst/>
-      </p:bgPr>
-    </p:bg>
-    <p:spTree>
-      <p:nvGrpSpPr>
-        <p:cNvPr id="1" name=""/>
-        <p:cNvGrpSpPr/>
-        <p:nvPr/>
-      </p:nvGrpSpPr>
-      <p:grpSpPr>
-        <a:xfrm>
-          <a:off x="0" y="0"/>
-          <a:ext cx="0" cy="0"/>
-          <a:chOff x="0" y="0"/>
-          <a:chExt cx="0" cy="0"/>
-        </a:xfrm>
-      </p:grpSpPr>
-      <p:sp>
-        <p:nvSpPr>
-          <p:cNvPr id="2" name="Title 1"/>
-          <p:cNvSpPr>
-            <a:spLocks noGrp="1"/>
-          </p:cNvSpPr>
-          <p:nvPr>
-            <p:ph type="title"/>
-          </p:nvPr>
-        </p:nvSpPr>
-        <p:spPr>
-          <a:xfrm>
-            <a:off x="457200" y="274638"/>
-            <a:ext cx="8229600" cy="2434282"/>
-          </a:xfrm>
-        </p:spPr>
-        <p:txBody>
-          <a:bodyPr/>
-          <a:lstStyle/>
-          <a:p>
-            <a:r>
-              <a:rPr lang="de-DE" dirty="0" smtClean="0">
-                <a:solidFill>
-                  <a:srgbClr val="FF0000"/>
-                </a:solidFill>
-              </a:rPr>
-              <a:t>Vielen Dank für die Aufmeksamkeit!</a:t>
-            </a:r>
-            <a:endParaRPr lang="en-US" dirty="0">
-              <a:solidFill>
-                <a:srgbClr val="FF0000"/>
-              </a:solidFill>
-            </a:endParaRPr>
-          </a:p>
-        </p:txBody>
-      </p:sp>
-      <p:sp>
-        <p:nvSpPr>
-          <p:cNvPr id="3" name="Content Placeholder 2"/>
-          <p:cNvSpPr>
-            <a:spLocks noGrp="1"/>
-          </p:cNvSpPr>
-          <p:nvPr>
-            <p:ph idx="1"/>
-          </p:nvPr>
-        </p:nvSpPr>
-        <p:spPr/>
-        <p:txBody>
-          <a:bodyPr/>
-          <a:lstStyle/>
-          <a:p>
-            <a:endParaRPr lang="en-US" dirty="0"/>
-          </a:p>
-        </p:txBody>
-      </p:sp>
-      <p:sp>
-        <p:nvSpPr>
-          <p:cNvPr id="4" name="Footer Placeholder 3"/>
-          <p:cNvSpPr>
-            <a:spLocks noGrp="1"/>
-          </p:cNvSpPr>
-          <p:nvPr>
-            <p:ph type="ftr" sz="quarter" idx="11"/>
-          </p:nvPr>
-        </p:nvSpPr>
-        <p:spPr/>
-        <p:txBody>
-          <a:bodyPr/>
-          <a:lstStyle/>
-          <a:p>
-            <a:r>
-              <a:rPr lang="en-US" smtClean="0"/>
-              <a:t>Projektseminar GameLab 2014</a:t>
-            </a:r>
-            <a:endParaRPr lang="en-US"/>
-          </a:p>
-        </p:txBody>
-      </p:sp>
-      <p:sp>
-        <p:nvSpPr>
-          <p:cNvPr id="5" name="Slide Number Placeholder 4"/>
-          <p:cNvSpPr>
-            <a:spLocks noGrp="1"/>
-          </p:cNvSpPr>
-          <p:nvPr>
-            <p:ph type="sldNum" sz="quarter" idx="12"/>
-          </p:nvPr>
-        </p:nvSpPr>
-        <p:spPr/>
-        <p:txBody>
-          <a:bodyPr/>
-          <a:lstStyle/>
-          <a:p>
-            <a:fld id="{6745021C-5F18-4753-8082-8C4943AC116D}" type="slidenum">
-              <a:rPr lang="en-US" smtClean="0"/>
-              <a:t>15</a:t>
-            </a:fld>
-            <a:endParaRPr lang="en-US"/>
-          </a:p>
-        </p:txBody>
-      </p:sp>
-    </p:spTree>
-    <p:extLst>
-      <p:ext uri="{BB962C8B-B14F-4D97-AF65-F5344CB8AC3E}">
-        <p14:creationId xmlns:p14="http://schemas.microsoft.com/office/powerpoint/2010/main" val="4202039149"/>
       </p:ext>
     </p:extLst>
   </p:cSld>
@@ -4923,8 +5016,13 @@
           <a:p>
             <a:r>
               <a:rPr lang="de-DE" dirty="0" smtClean="0"/>
-              <a:t>Spielkonzept</a:t>
-            </a:r>
+              <a:t>Spielkonzept/</a:t>
+            </a:r>
+            <a:r>
+              <a:rPr lang="de-DE" dirty="0" err="1" smtClean="0"/>
+              <a:t>Storyline</a:t>
+            </a:r>
+            <a:endParaRPr lang="de-DE" dirty="0" smtClean="0"/>
           </a:p>
           <a:p>
             <a:r>
@@ -5015,6 +5113,7 @@
           <a:p>
             <a:fld id="{6745021C-5F18-4753-8082-8C4943AC116D}" type="slidenum">
               <a:rPr lang="en-US" smtClean="0"/>
+              <a:pPr/>
               <a:t>2</a:t>
             </a:fld>
             <a:endParaRPr lang="en-US" dirty="0"/>
@@ -5170,6 +5269,7 @@
           <a:p>
             <a:fld id="{6745021C-5F18-4753-8082-8C4943AC116D}" type="slidenum">
               <a:rPr lang="en-US" smtClean="0"/>
+              <a:pPr/>
               <a:t>3</a:t>
             </a:fld>
             <a:endParaRPr lang="en-US"/>
@@ -5255,7 +5355,15 @@
           <a:p>
             <a:r>
               <a:rPr lang="de-DE" dirty="0" smtClean="0"/>
-              <a:t>Zentralcomputer holt die Spieler aus dem kryogenischen Schlaf</a:t>
+              <a:t>Die Spieler, die die Astronauten spielen, wachen aus dem </a:t>
+            </a:r>
+            <a:r>
+              <a:rPr lang="de-DE" dirty="0" err="1" smtClean="0"/>
+              <a:t>kryogenischen</a:t>
+            </a:r>
+            <a:r>
+              <a:rPr lang="de-DE" dirty="0" smtClean="0"/>
+              <a:t> Schlaf auf</a:t>
             </a:r>
           </a:p>
           <a:p>
@@ -5320,6 +5428,7 @@
           <a:p>
             <a:fld id="{6745021C-5F18-4753-8082-8C4943AC116D}" type="slidenum">
               <a:rPr lang="en-US" smtClean="0"/>
+              <a:pPr/>
               <a:t>4</a:t>
             </a:fld>
             <a:endParaRPr lang="en-US"/>
@@ -5335,7 +5444,7 @@
           <p:nvPr/>
         </p:nvPicPr>
         <p:blipFill>
-          <a:blip r:embed="rId2">
+          <a:blip r:embed="rId2" cstate="print">
             <a:extLst>
               <a:ext uri="{28A0092B-C50C-407E-A947-70E740481C1C}">
                 <a14:useLocalDpi xmlns:a14="http://schemas.microsoft.com/office/drawing/2010/main" val="0"/>
@@ -5412,7 +5521,7 @@
     <p:bg>
       <p:bgPr>
         <a:blipFill dpi="0" rotWithShape="1">
-          <a:blip r:embed="rId2">
+          <a:blip r:embed="rId2" cstate="print">
             <a:alphaModFix amt="64000"/>
             <a:lum/>
           </a:blip>
@@ -5502,10 +5611,13 @@
           <a:p>
             <a:r>
               <a:rPr lang="de-DE" dirty="0" smtClean="0"/>
-              <a:t>In der Mitte befindet sich die Kontrollzentrale mit dem Zentralcomputer</a:t>
-            </a:r>
-          </a:p>
-          <a:p>
+              <a:t>Kontrollzentrale unabhängig von den anderen Räumen</a:t>
+            </a:r>
+          </a:p>
+          <a:p>
+            <a:pPr>
+              <a:buNone/>
+            </a:pPr>
             <a:endParaRPr lang="de-DE" dirty="0" smtClean="0"/>
           </a:p>
         </p:txBody>
@@ -5550,6 +5662,7 @@
           <a:p>
             <a:fld id="{6745021C-5F18-4753-8082-8C4943AC116D}" type="slidenum">
               <a:rPr lang="en-US" smtClean="0"/>
+              <a:pPr/>
               <a:t>5</a:t>
             </a:fld>
             <a:endParaRPr lang="en-US"/>
@@ -5595,6 +5708,132 @@
       </p:grpSpPr>
       <p:sp>
         <p:nvSpPr>
+          <p:cNvPr id="2" name="Titel 1"/>
+          <p:cNvSpPr>
+            <a:spLocks noGrp="1"/>
+          </p:cNvSpPr>
+          <p:nvPr>
+            <p:ph type="title"/>
+          </p:nvPr>
+        </p:nvSpPr>
+        <p:spPr/>
+        <p:txBody>
+          <a:bodyPr/>
+          <a:lstStyle/>
+          <a:p>
+            <a:r>
+              <a:rPr lang="de-DE" dirty="0" smtClean="0"/>
+              <a:t>Raumstation:</a:t>
+            </a:r>
+            <a:endParaRPr lang="en-GB" dirty="0"/>
+          </a:p>
+        </p:txBody>
+      </p:sp>
+      <p:sp>
+        <p:nvSpPr>
+          <p:cNvPr id="3" name="Inhaltsplatzhalter 2"/>
+          <p:cNvSpPr>
+            <a:spLocks noGrp="1"/>
+          </p:cNvSpPr>
+          <p:nvPr>
+            <p:ph idx="1"/>
+          </p:nvPr>
+        </p:nvSpPr>
+        <p:spPr/>
+        <p:txBody>
+          <a:bodyPr/>
+          <a:lstStyle/>
+          <a:p>
+            <a:r>
+              <a:rPr lang="de-DE" dirty="0" smtClean="0">
+                <a:solidFill>
+                  <a:srgbClr val="FF0000"/>
+                </a:solidFill>
+              </a:rPr>
+              <a:t>Bild: Raumstation</a:t>
+            </a:r>
+            <a:endParaRPr lang="en-GB" dirty="0">
+              <a:solidFill>
+                <a:srgbClr val="FF0000"/>
+              </a:solidFill>
+            </a:endParaRPr>
+          </a:p>
+        </p:txBody>
+      </p:sp>
+      <p:sp>
+        <p:nvSpPr>
+          <p:cNvPr id="4" name="Fußzeilenplatzhalter 3"/>
+          <p:cNvSpPr>
+            <a:spLocks noGrp="1"/>
+          </p:cNvSpPr>
+          <p:nvPr>
+            <p:ph type="ftr" sz="quarter" idx="11"/>
+          </p:nvPr>
+        </p:nvSpPr>
+        <p:spPr/>
+        <p:txBody>
+          <a:bodyPr/>
+          <a:lstStyle/>
+          <a:p>
+            <a:r>
+              <a:rPr lang="en-US" smtClean="0"/>
+              <a:t>Projektseminar GameLab 2014</a:t>
+            </a:r>
+            <a:endParaRPr lang="en-US"/>
+          </a:p>
+        </p:txBody>
+      </p:sp>
+      <p:sp>
+        <p:nvSpPr>
+          <p:cNvPr id="5" name="Foliennummernplatzhalter 4"/>
+          <p:cNvSpPr>
+            <a:spLocks noGrp="1"/>
+          </p:cNvSpPr>
+          <p:nvPr>
+            <p:ph type="sldNum" sz="quarter" idx="12"/>
+          </p:nvPr>
+        </p:nvSpPr>
+        <p:spPr/>
+        <p:txBody>
+          <a:bodyPr/>
+          <a:lstStyle/>
+          <a:p>
+            <a:fld id="{6745021C-5F18-4753-8082-8C4943AC116D}" type="slidenum">
+              <a:rPr lang="en-US" smtClean="0"/>
+              <a:pPr/>
+              <a:t>6</a:t>
+            </a:fld>
+            <a:endParaRPr lang="en-US"/>
+          </a:p>
+        </p:txBody>
+      </p:sp>
+    </p:spTree>
+  </p:cSld>
+  <p:clrMapOvr>
+    <a:masterClrMapping/>
+  </p:clrMapOvr>
+</p:sld>
+</file>
+
+<file path=ppt/slides/slide7.xml><?xml version="1.0" encoding="utf-8"?>
+<p:sld xmlns:a="http://schemas.openxmlformats.org/drawingml/2006/main" xmlns:r="http://schemas.openxmlformats.org/officeDocument/2006/relationships" xmlns:p="http://schemas.openxmlformats.org/presentationml/2006/main">
+  <p:cSld>
+    <p:spTree>
+      <p:nvGrpSpPr>
+        <p:cNvPr id="1" name=""/>
+        <p:cNvGrpSpPr/>
+        <p:nvPr/>
+      </p:nvGrpSpPr>
+      <p:grpSpPr>
+        <a:xfrm>
+          <a:off x="0" y="0"/>
+          <a:ext cx="0" cy="0"/>
+          <a:chOff x="0" y="0"/>
+          <a:chExt cx="0" cy="0"/>
+        </a:xfrm>
+      </p:grpSpPr>
+      <p:sp>
+        <p:nvSpPr>
           <p:cNvPr id="2" name="Title 1"/>
           <p:cNvSpPr>
             <a:spLocks noGrp="1"/>
@@ -5612,7 +5851,15 @@
           <a:p>
             <a:r>
               <a:rPr lang="de-DE" dirty="0" smtClean="0"/>
-              <a:t>Spielkonzept: </a:t>
+              <a:t>Spielkonzept/</a:t>
+            </a:r>
+            <a:r>
+              <a:rPr lang="de-DE" dirty="0" err="1" smtClean="0"/>
+              <a:t>Storyline</a:t>
+            </a:r>
+            <a:r>
+              <a:rPr lang="de-DE" dirty="0" smtClean="0"/>
+              <a:t>: </a:t>
             </a:r>
             <a:endParaRPr lang="en-US" dirty="0"/>
           </a:p>
@@ -5637,7 +5884,7 @@
           <a:p>
             <a:r>
               <a:rPr lang="de-DE" dirty="0" smtClean="0"/>
-              <a:t>Astronauten kämpfen sich zur Kommandozentrale vor</a:t>
+              <a:t>Astronauten kämpfen sich zur Kontrollzentrale vor</a:t>
             </a:r>
           </a:p>
           <a:p>
@@ -5661,15 +5908,19 @@
           <a:p>
             <a:pPr lvl="1"/>
             <a:r>
-              <a:rPr lang="de-DE" dirty="0" smtClean="0"/>
-              <a:t>Spawnt Aliens</a:t>
+              <a:rPr lang="de-DE" dirty="0" err="1" smtClean="0"/>
+              <a:t>Spawnt</a:t>
+            </a:r>
+            <a:r>
+              <a:rPr lang="de-DE" dirty="0" smtClean="0"/>
+              <a:t> Kampfaliens</a:t>
             </a:r>
           </a:p>
           <a:p>
             <a:pPr lvl="1"/>
             <a:r>
               <a:rPr lang="de-DE" dirty="0" smtClean="0"/>
-              <a:t>Stellt Strom ab</a:t>
+              <a:t>Stellt Licht in den Sektoren aus</a:t>
             </a:r>
           </a:p>
           <a:p>
@@ -5725,7 +5976,8 @@
           <a:p>
             <a:fld id="{6745021C-5F18-4753-8082-8C4943AC116D}" type="slidenum">
               <a:rPr lang="en-US" smtClean="0"/>
-              <a:t>6</a:t>
+              <a:pPr/>
+              <a:t>7</a:t>
             </a:fld>
             <a:endParaRPr lang="en-US"/>
           </a:p>
@@ -5744,13 +5996,13 @@
 </p:sld>
 </file>
 
-<file path=ppt/slides/slide7.xml><?xml version="1.0" encoding="utf-8"?>
+<file path=ppt/slides/slide8.xml><?xml version="1.0" encoding="utf-8"?>
 <p:sld xmlns:a="http://schemas.openxmlformats.org/drawingml/2006/main" xmlns:r="http://schemas.openxmlformats.org/officeDocument/2006/relationships" xmlns:p="http://schemas.openxmlformats.org/presentationml/2006/main">
   <p:cSld>
     <p:bg>
       <p:bgPr>
         <a:blipFill dpi="0" rotWithShape="1">
-          <a:blip r:embed="rId2">
+          <a:blip r:embed="rId2" cstate="print">
             <a:alphaModFix amt="64000"/>
             <a:lum/>
           </a:blip>
@@ -5830,25 +6082,21 @@
             <a:pPr lvl="1"/>
             <a:r>
               <a:rPr lang="de-DE" dirty="0" smtClean="0"/>
-              <a:t>Müssen den Weg zum Zentralcomputer finden</a:t>
+              <a:t>Müssen den Weg zur Kontrollzentrale finden</a:t>
             </a:r>
           </a:p>
           <a:p>
             <a:pPr lvl="1"/>
             <a:r>
-              <a:rPr lang="de-DE" smtClean="0"/>
-              <a:t>Reparieren die </a:t>
-            </a:r>
-            <a:r>
-              <a:rPr lang="de-DE" dirty="0" smtClean="0"/>
-              <a:t>Raumstation</a:t>
+              <a:rPr lang="de-DE" dirty="0" smtClean="0"/>
+              <a:t>Reparieren die Raumstation</a:t>
             </a:r>
           </a:p>
           <a:p>
             <a:pPr lvl="1"/>
             <a:r>
               <a:rPr lang="de-DE" dirty="0" smtClean="0"/>
-              <a:t>Grundausstattung: Basiswaffe</a:t>
+              <a:t>Finden auf dem Weg Waffen und Gegenstände</a:t>
             </a:r>
           </a:p>
           <a:p>
@@ -5914,7 +6162,8 @@
           <a:p>
             <a:fld id="{6745021C-5F18-4753-8082-8C4943AC116D}" type="slidenum">
               <a:rPr lang="en-US" smtClean="0"/>
-              <a:t>7</a:t>
+              <a:pPr/>
+              <a:t>8</a:t>
             </a:fld>
             <a:endParaRPr lang="en-US"/>
           </a:p>
@@ -5940,13 +6189,13 @@
 </p:sld>
 </file>
 
-<file path=ppt/slides/slide8.xml><?xml version="1.0" encoding="utf-8"?>
+<file path=ppt/slides/slide9.xml><?xml version="1.0" encoding="utf-8"?>
 <p:sld xmlns:a="http://schemas.openxmlformats.org/drawingml/2006/main" xmlns:r="http://schemas.openxmlformats.org/officeDocument/2006/relationships" xmlns:p="http://schemas.openxmlformats.org/presentationml/2006/main">
   <p:cSld>
     <p:bg>
       <p:bgPr>
         <a:blipFill dpi="0" rotWithShape="1">
-          <a:blip r:embed="rId2">
+          <a:blip r:embed="rId2" cstate="print">
             <a:alphaModFix amt="64000"/>
             <a:lum/>
           </a:blip>
@@ -6021,19 +6270,14 @@
             <a:pPr lvl="1"/>
             <a:r>
               <a:rPr lang="de-DE" dirty="0" smtClean="0"/>
-              <a:t>Befindet sich in der Kommandozentrale </a:t>
-            </a:r>
-            <a:endParaRPr lang="de-DE" dirty="0" smtClean="0"/>
+              <a:t>Befindet sich in der Kontrollzentrale </a:t>
+            </a:r>
           </a:p>
           <a:p>
             <a:pPr lvl="1"/>
             <a:r>
               <a:rPr lang="de-DE" dirty="0" smtClean="0"/>
-              <a:t>Kontrolliert </a:t>
-            </a:r>
-            <a:r>
-              <a:rPr lang="de-DE" dirty="0" smtClean="0"/>
-              <a:t>den Zentralcomputer </a:t>
+              <a:t>Kontrolliert den Zentralcomputer </a:t>
             </a:r>
           </a:p>
           <a:p>
@@ -6065,13 +6309,8 @@
             <a:pPr lvl="1"/>
             <a:r>
               <a:rPr lang="de-DE" dirty="0" smtClean="0"/>
-              <a:t>Kann Strom in Abschnitten </a:t>
-            </a:r>
-            <a:r>
-              <a:rPr lang="de-DE" dirty="0" smtClean="0"/>
-              <a:t>ausschalten</a:t>
-            </a:r>
-            <a:endParaRPr lang="de-DE" dirty="0" smtClean="0"/>
+              <a:t>Kann Licht in Abschnitten ausschalten</a:t>
+            </a:r>
           </a:p>
           <a:p>
             <a:pPr lvl="1"/>
@@ -6130,7 +6369,8 @@
           <a:p>
             <a:fld id="{6745021C-5F18-4753-8082-8C4943AC116D}" type="slidenum">
               <a:rPr lang="en-US" smtClean="0"/>
-              <a:t>8</a:t>
+              <a:pPr/>
+              <a:t>9</a:t>
             </a:fld>
             <a:endParaRPr lang="en-US"/>
           </a:p>
@@ -6140,168 +6380,6 @@
     <p:extLst>
       <p:ext uri="{BB962C8B-B14F-4D97-AF65-F5344CB8AC3E}">
         <p14:creationId xmlns:p14="http://schemas.microsoft.com/office/powerpoint/2010/main" val="3619335935"/>
-      </p:ext>
-    </p:extLst>
-  </p:cSld>
-  <p:clrMapOvr>
-    <a:masterClrMapping/>
-  </p:clrMapOvr>
-</p:sld>
-</file>
-
-<file path=ppt/slides/slide9.xml><?xml version="1.0" encoding="utf-8"?>
-<p:sld xmlns:a="http://schemas.openxmlformats.org/drawingml/2006/main" xmlns:r="http://schemas.openxmlformats.org/officeDocument/2006/relationships" xmlns:p="http://schemas.openxmlformats.org/presentationml/2006/main">
-  <p:cSld>
-    <p:spTree>
-      <p:nvGrpSpPr>
-        <p:cNvPr id="1" name=""/>
-        <p:cNvGrpSpPr/>
-        <p:nvPr/>
-      </p:nvGrpSpPr>
-      <p:grpSpPr>
-        <a:xfrm>
-          <a:off x="0" y="0"/>
-          <a:ext cx="0" cy="0"/>
-          <a:chOff x="0" y="0"/>
-          <a:chExt cx="0" cy="0"/>
-        </a:xfrm>
-      </p:grpSpPr>
-      <p:sp>
-        <p:nvSpPr>
-          <p:cNvPr id="2" name="Title 1"/>
-          <p:cNvSpPr>
-            <a:spLocks noGrp="1"/>
-          </p:cNvSpPr>
-          <p:nvPr>
-            <p:ph type="title"/>
-          </p:nvPr>
-        </p:nvSpPr>
-        <p:spPr/>
-        <p:txBody>
-          <a:bodyPr/>
-          <a:lstStyle/>
-          <a:p>
-            <a:r>
-              <a:rPr lang="de-DE" dirty="0" smtClean="0"/>
-              <a:t>Der Zentralcomputer:</a:t>
-            </a:r>
-            <a:endParaRPr lang="en-US" dirty="0"/>
-          </a:p>
-        </p:txBody>
-      </p:sp>
-      <p:sp>
-        <p:nvSpPr>
-          <p:cNvPr id="3" name="Content Placeholder 2"/>
-          <p:cNvSpPr>
-            <a:spLocks noGrp="1"/>
-          </p:cNvSpPr>
-          <p:nvPr>
-            <p:ph idx="1"/>
-          </p:nvPr>
-        </p:nvSpPr>
-        <p:spPr/>
-        <p:txBody>
-          <a:bodyPr/>
-          <a:lstStyle/>
-          <a:p>
-            <a:r>
-              <a:rPr lang="de-DE" dirty="0" smtClean="0"/>
-              <a:t>Herzstück der Raumstation</a:t>
-            </a:r>
-          </a:p>
-          <a:p>
-            <a:r>
-              <a:rPr lang="de-DE" dirty="0" smtClean="0"/>
-              <a:t>Übersicht über den Zustand der Station</a:t>
-            </a:r>
-            <a:r>
-              <a:rPr lang="en-US" dirty="0" smtClean="0"/>
-              <a:t> und die </a:t>
-            </a:r>
-            <a:r>
-              <a:rPr lang="en-US" dirty="0" err="1" smtClean="0"/>
-              <a:t>Besatzung</a:t>
-            </a:r>
-            <a:endParaRPr lang="en-US" dirty="0" smtClean="0"/>
-          </a:p>
-          <a:p>
-            <a:r>
-              <a:rPr lang="de-DE" dirty="0" smtClean="0"/>
-              <a:t>Hat Kontrolle über die Position der Ringe</a:t>
-            </a:r>
-            <a:endParaRPr lang="en-US" dirty="0" smtClean="0"/>
-          </a:p>
-          <a:p>
-            <a:r>
-              <a:rPr lang="de-DE" dirty="0" smtClean="0"/>
-              <a:t>Terminals auf der Station verteilt: </a:t>
-            </a:r>
-          </a:p>
-          <a:p>
-            <a:pPr lvl="1"/>
-            <a:r>
-              <a:rPr lang="de-DE" dirty="0" smtClean="0"/>
-              <a:t>Zeigen den Astronauten an, wie die Ringe stehen</a:t>
-            </a:r>
-          </a:p>
-          <a:p>
-            <a:pPr marL="457200" lvl="1" indent="0">
-              <a:buNone/>
-            </a:pPr>
-            <a:endParaRPr lang="de-DE" dirty="0"/>
-          </a:p>
-        </p:txBody>
-      </p:sp>
-      <p:sp>
-        <p:nvSpPr>
-          <p:cNvPr id="4" name="Footer Placeholder 3"/>
-          <p:cNvSpPr>
-            <a:spLocks noGrp="1"/>
-          </p:cNvSpPr>
-          <p:nvPr>
-            <p:ph type="ftr" sz="quarter" idx="11"/>
-          </p:nvPr>
-        </p:nvSpPr>
-        <p:spPr/>
-        <p:txBody>
-          <a:bodyPr/>
-          <a:lstStyle/>
-          <a:p>
-            <a:r>
-              <a:rPr lang="en-US" smtClean="0"/>
-              <a:t>Projektseminar GameLab 2014</a:t>
-            </a:r>
-            <a:endParaRPr lang="en-US"/>
-          </a:p>
-        </p:txBody>
-      </p:sp>
-      <p:sp>
-        <p:nvSpPr>
-          <p:cNvPr id="5" name="Slide Number Placeholder 4"/>
-          <p:cNvSpPr>
-            <a:spLocks noGrp="1"/>
-          </p:cNvSpPr>
-          <p:nvPr>
-            <p:ph type="sldNum" sz="quarter" idx="12"/>
-          </p:nvPr>
-        </p:nvSpPr>
-        <p:spPr/>
-        <p:txBody>
-          <a:bodyPr/>
-          <a:lstStyle/>
-          <a:p>
-            <a:fld id="{6745021C-5F18-4753-8082-8C4943AC116D}" type="slidenum">
-              <a:rPr lang="en-US" smtClean="0"/>
-              <a:t>9</a:t>
-            </a:fld>
-            <a:endParaRPr lang="en-US"/>
-          </a:p>
-        </p:txBody>
-      </p:sp>
-    </p:spTree>
-    <p:extLst>
-      <p:ext uri="{BB962C8B-B14F-4D97-AF65-F5344CB8AC3E}">
-        <p14:creationId xmlns:p14="http://schemas.microsoft.com/office/powerpoint/2010/main" val="1527997353"/>
       </p:ext>
     </p:extLst>
   </p:cSld>

</xml_diff>

<commit_message>
Änderung in Google Drive geschrieben und aus Datei genommen
</commit_message>
<xml_diff>
--- a/Abschlusspräsentation/SpielkonzeptFINAL.pptx
+++ b/Abschlusspräsentation/SpielkonzeptFINAL.pptx
@@ -5,7 +5,7 @@
     <p:sldMasterId id="2147483756" r:id="rId1"/>
   </p:sldMasterIdLst>
   <p:notesMasterIdLst>
-    <p:notesMasterId r:id="rId23"/>
+    <p:notesMasterId r:id="rId16"/>
   </p:notesMasterIdLst>
   <p:sldIdLst>
     <p:sldId id="256" r:id="rId2"/>
@@ -22,13 +22,6 @@
     <p:sldId id="267" r:id="rId13"/>
     <p:sldId id="270" r:id="rId14"/>
     <p:sldId id="268" r:id="rId15"/>
-    <p:sldId id="280" r:id="rId16"/>
-    <p:sldId id="281" r:id="rId17"/>
-    <p:sldId id="284" r:id="rId18"/>
-    <p:sldId id="283" r:id="rId19"/>
-    <p:sldId id="282" r:id="rId20"/>
-    <p:sldId id="285" r:id="rId21"/>
-    <p:sldId id="286" r:id="rId22"/>
   </p:sldIdLst>
   <p:sldSz cx="9144000" cy="6858000" type="screen4x3"/>
   <p:notesSz cx="6858000" cy="9144000"/>
@@ -213,7 +206,7 @@
             <a:fld id="{6C8D679A-4C3F-4B31-9549-C990ADA7B7B3}" type="datetimeFigureOut">
               <a:rPr lang="en-US" smtClean="0"/>
               <a:pPr/>
-              <a:t>8/18/2014</a:t>
+              <a:t>8/19/2014</a:t>
             </a:fld>
             <a:endParaRPr lang="en-US"/>
           </a:p>
@@ -373,7 +366,7 @@
             <a:fld id="{038F293B-2B09-49A1-A37F-9244127D38DE}" type="slidenum">
               <a:rPr lang="en-US" smtClean="0"/>
               <a:pPr/>
-              <a:t>‹#›</a:t>
+              <a:t>‹Nr.›</a:t>
             </a:fld>
             <a:endParaRPr lang="en-US"/>
           </a:p>
@@ -749,7 +742,7 @@
             <a:fld id="{7DE78ED9-FA8B-4821-9A8D-E9D93B72894B}" type="datetime1">
               <a:rPr lang="en-US" smtClean="0"/>
               <a:pPr/>
-              <a:t>8/18/2014</a:t>
+              <a:t>8/19/2014</a:t>
             </a:fld>
             <a:endParaRPr lang="en-US"/>
           </a:p>
@@ -796,7 +789,7 @@
             <a:fld id="{6745021C-5F18-4753-8082-8C4943AC116D}" type="slidenum">
               <a:rPr lang="en-US" smtClean="0"/>
               <a:pPr/>
-              <a:t>‹#›</a:t>
+              <a:t>‹Nr.›</a:t>
             </a:fld>
             <a:endParaRPr lang="en-US"/>
           </a:p>
@@ -925,7 +918,7 @@
             <a:fld id="{FDEE3AEF-6B87-4981-B31A-51EE0768E404}" type="datetime1">
               <a:rPr lang="en-US" smtClean="0"/>
               <a:pPr/>
-              <a:t>8/18/2014</a:t>
+              <a:t>8/19/2014</a:t>
             </a:fld>
             <a:endParaRPr lang="en-US"/>
           </a:p>
@@ -972,7 +965,7 @@
             <a:fld id="{6745021C-5F18-4753-8082-8C4943AC116D}" type="slidenum">
               <a:rPr lang="en-US" smtClean="0"/>
               <a:pPr/>
-              <a:t>‹#›</a:t>
+              <a:t>‹Nr.›</a:t>
             </a:fld>
             <a:endParaRPr lang="en-US"/>
           </a:p>
@@ -1111,7 +1104,7 @@
             <a:fld id="{D35A51C1-B616-4430-AD17-E164F838DD85}" type="datetime1">
               <a:rPr lang="en-US" smtClean="0"/>
               <a:pPr/>
-              <a:t>8/18/2014</a:t>
+              <a:t>8/19/2014</a:t>
             </a:fld>
             <a:endParaRPr lang="en-US"/>
           </a:p>
@@ -1158,7 +1151,7 @@
             <a:fld id="{6745021C-5F18-4753-8082-8C4943AC116D}" type="slidenum">
               <a:rPr lang="en-US" smtClean="0"/>
               <a:pPr/>
-              <a:t>‹#›</a:t>
+              <a:t>‹Nr.›</a:t>
             </a:fld>
             <a:endParaRPr lang="en-US"/>
           </a:p>
@@ -1287,7 +1280,7 @@
             <a:fld id="{6A0CB1FF-596A-4167-9E9F-24398217BB8E}" type="datetime1">
               <a:rPr lang="en-US" smtClean="0"/>
               <a:pPr/>
-              <a:t>8/18/2014</a:t>
+              <a:t>8/19/2014</a:t>
             </a:fld>
             <a:endParaRPr lang="en-US"/>
           </a:p>
@@ -1334,7 +1327,7 @@
             <a:fld id="{6745021C-5F18-4753-8082-8C4943AC116D}" type="slidenum">
               <a:rPr lang="en-US" smtClean="0"/>
               <a:pPr/>
-              <a:t>‹#›</a:t>
+              <a:t>‹Nr.›</a:t>
             </a:fld>
             <a:endParaRPr lang="en-US"/>
           </a:p>
@@ -1539,7 +1532,7 @@
             <a:fld id="{E53B6A07-A1F1-4423-88A0-74F9F2526806}" type="datetime1">
               <a:rPr lang="en-US" smtClean="0"/>
               <a:pPr/>
-              <a:t>8/18/2014</a:t>
+              <a:t>8/19/2014</a:t>
             </a:fld>
             <a:endParaRPr lang="en-US"/>
           </a:p>
@@ -1586,7 +1579,7 @@
             <a:fld id="{6745021C-5F18-4753-8082-8C4943AC116D}" type="slidenum">
               <a:rPr lang="en-US" smtClean="0"/>
               <a:pPr/>
-              <a:t>‹#›</a:t>
+              <a:t>‹Nr.›</a:t>
             </a:fld>
             <a:endParaRPr lang="en-US"/>
           </a:p>
@@ -1833,7 +1826,7 @@
             <a:fld id="{07CA06E5-71DE-4B9E-8B4D-783572FC6C34}" type="datetime1">
               <a:rPr lang="en-US" smtClean="0"/>
               <a:pPr/>
-              <a:t>8/18/2014</a:t>
+              <a:t>8/19/2014</a:t>
             </a:fld>
             <a:endParaRPr lang="en-US"/>
           </a:p>
@@ -1880,7 +1873,7 @@
             <a:fld id="{6745021C-5F18-4753-8082-8C4943AC116D}" type="slidenum">
               <a:rPr lang="en-US" smtClean="0"/>
               <a:pPr/>
-              <a:t>‹#›</a:t>
+              <a:t>‹Nr.›</a:t>
             </a:fld>
             <a:endParaRPr lang="en-US"/>
           </a:p>
@@ -2261,7 +2254,7 @@
             <a:fld id="{872FE14D-79A8-46E0-9FA0-BF1122279766}" type="datetime1">
               <a:rPr lang="en-US" smtClean="0"/>
               <a:pPr/>
-              <a:t>8/18/2014</a:t>
+              <a:t>8/19/2014</a:t>
             </a:fld>
             <a:endParaRPr lang="en-US"/>
           </a:p>
@@ -2308,7 +2301,7 @@
             <a:fld id="{6745021C-5F18-4753-8082-8C4943AC116D}" type="slidenum">
               <a:rPr lang="en-US" smtClean="0"/>
               <a:pPr/>
-              <a:t>‹#›</a:t>
+              <a:t>‹Nr.›</a:t>
             </a:fld>
             <a:endParaRPr lang="en-US"/>
           </a:p>
@@ -2385,7 +2378,7 @@
             <a:fld id="{1D55895C-ADF6-45D0-B6A7-2828EEECD075}" type="datetime1">
               <a:rPr lang="en-US" smtClean="0"/>
               <a:pPr/>
-              <a:t>8/18/2014</a:t>
+              <a:t>8/19/2014</a:t>
             </a:fld>
             <a:endParaRPr lang="en-US"/>
           </a:p>
@@ -2432,7 +2425,7 @@
             <a:fld id="{6745021C-5F18-4753-8082-8C4943AC116D}" type="slidenum">
               <a:rPr lang="en-US" smtClean="0"/>
               <a:pPr/>
-              <a:t>‹#›</a:t>
+              <a:t>‹Nr.›</a:t>
             </a:fld>
             <a:endParaRPr lang="en-US"/>
           </a:p>
@@ -2486,7 +2479,7 @@
             <a:fld id="{22C97497-BB50-43CD-818F-0266E7B075ED}" type="datetime1">
               <a:rPr lang="en-US" smtClean="0"/>
               <a:pPr/>
-              <a:t>8/18/2014</a:t>
+              <a:t>8/19/2014</a:t>
             </a:fld>
             <a:endParaRPr lang="en-US"/>
           </a:p>
@@ -2533,7 +2526,7 @@
             <a:fld id="{6745021C-5F18-4753-8082-8C4943AC116D}" type="slidenum">
               <a:rPr lang="en-US" smtClean="0"/>
               <a:pPr/>
-              <a:t>‹#›</a:t>
+              <a:t>‹Nr.›</a:t>
             </a:fld>
             <a:endParaRPr lang="en-US"/>
           </a:p>
@@ -2769,7 +2762,7 @@
             <a:fld id="{FD5B2064-0D07-4398-BE77-CFDCBB5DD24D}" type="datetime1">
               <a:rPr lang="en-US" smtClean="0"/>
               <a:pPr/>
-              <a:t>8/18/2014</a:t>
+              <a:t>8/19/2014</a:t>
             </a:fld>
             <a:endParaRPr lang="en-US"/>
           </a:p>
@@ -2816,7 +2809,7 @@
             <a:fld id="{6745021C-5F18-4753-8082-8C4943AC116D}" type="slidenum">
               <a:rPr lang="en-US" smtClean="0"/>
               <a:pPr/>
-              <a:t>‹#›</a:t>
+              <a:t>‹Nr.›</a:t>
             </a:fld>
             <a:endParaRPr lang="en-US"/>
           </a:p>
@@ -3028,7 +3021,7 @@
             <a:fld id="{A23FA488-4A49-4D8C-A65E-F1F29AF5C4F1}" type="datetime1">
               <a:rPr lang="en-US" smtClean="0"/>
               <a:pPr/>
-              <a:t>8/18/2014</a:t>
+              <a:t>8/19/2014</a:t>
             </a:fld>
             <a:endParaRPr lang="en-US"/>
           </a:p>
@@ -3075,7 +3068,7 @@
             <a:fld id="{6745021C-5F18-4753-8082-8C4943AC116D}" type="slidenum">
               <a:rPr lang="en-US" smtClean="0"/>
               <a:pPr/>
-              <a:t>‹#›</a:t>
+              <a:t>‹Nr.›</a:t>
             </a:fld>
             <a:endParaRPr lang="en-US"/>
           </a:p>
@@ -3257,7 +3250,7 @@
             <a:fld id="{50705CCB-25BA-454A-AD9E-677270D6AFBE}" type="datetime1">
               <a:rPr lang="en-US" smtClean="0"/>
               <a:pPr/>
-              <a:t>8/18/2014</a:t>
+              <a:t>8/19/2014</a:t>
             </a:fld>
             <a:endParaRPr lang="en-US"/>
           </a:p>
@@ -3340,7 +3333,7 @@
             <a:fld id="{6745021C-5F18-4753-8082-8C4943AC116D}" type="slidenum">
               <a:rPr lang="en-US" smtClean="0"/>
               <a:pPr/>
-              <a:t>‹#›</a:t>
+              <a:t>‹Nr.›</a:t>
             </a:fld>
             <a:endParaRPr lang="en-US"/>
           </a:p>
@@ -4714,13 +4707,8 @@
           <a:p>
             <a:r>
               <a:rPr lang="de-DE" dirty="0" smtClean="0"/>
-              <a:t>Vollständige Spiellösung: </a:t>
-            </a:r>
-            <a:r>
-              <a:rPr lang="de-DE" dirty="0" smtClean="0"/>
-              <a:t>Siehe Lösungsbuch</a:t>
-            </a:r>
-            <a:endParaRPr lang="de-DE" dirty="0" smtClean="0"/>
+              <a:t>Vollständige Spiellösung: Siehe Lösungsbuch</a:t>
+            </a:r>
           </a:p>
         </p:txBody>
       </p:sp>
@@ -4791,1526 +4779,6 @@
 </p:sld>
 </file>
 
-<file path=ppt/slides/slide15.xml><?xml version="1.0" encoding="utf-8"?>
-<p:sld xmlns:a="http://schemas.openxmlformats.org/drawingml/2006/main" xmlns:r="http://schemas.openxmlformats.org/officeDocument/2006/relationships" xmlns:p="http://schemas.openxmlformats.org/presentationml/2006/main">
-  <p:cSld>
-    <p:spTree>
-      <p:nvGrpSpPr>
-        <p:cNvPr id="1" name=""/>
-        <p:cNvGrpSpPr/>
-        <p:nvPr/>
-      </p:nvGrpSpPr>
-      <p:grpSpPr>
-        <a:xfrm>
-          <a:off x="0" y="0"/>
-          <a:ext cx="0" cy="0"/>
-          <a:chOff x="0" y="0"/>
-          <a:chExt cx="0" cy="0"/>
-        </a:xfrm>
-      </p:grpSpPr>
-      <p:sp>
-        <p:nvSpPr>
-          <p:cNvPr id="4" name="Fußzeilenplatzhalter 3"/>
-          <p:cNvSpPr>
-            <a:spLocks noGrp="1"/>
-          </p:cNvSpPr>
-          <p:nvPr>
-            <p:ph type="ftr" sz="quarter" idx="11"/>
-          </p:nvPr>
-        </p:nvSpPr>
-        <p:spPr/>
-        <p:txBody>
-          <a:bodyPr/>
-          <a:lstStyle/>
-          <a:p>
-            <a:r>
-              <a:rPr lang="en-US" smtClean="0"/>
-              <a:t>Projektseminar GameLab 2014</a:t>
-            </a:r>
-            <a:endParaRPr lang="en-US"/>
-          </a:p>
-        </p:txBody>
-      </p:sp>
-      <p:sp>
-        <p:nvSpPr>
-          <p:cNvPr id="5" name="Foliennummernplatzhalter 4"/>
-          <p:cNvSpPr>
-            <a:spLocks noGrp="1"/>
-          </p:cNvSpPr>
-          <p:nvPr>
-            <p:ph type="sldNum" sz="quarter" idx="12"/>
-          </p:nvPr>
-        </p:nvSpPr>
-        <p:spPr/>
-        <p:txBody>
-          <a:bodyPr/>
-          <a:lstStyle/>
-          <a:p>
-            <a:fld id="{6745021C-5F18-4753-8082-8C4943AC116D}" type="slidenum">
-              <a:rPr lang="en-US" smtClean="0"/>
-              <a:pPr/>
-              <a:t>15</a:t>
-            </a:fld>
-            <a:endParaRPr lang="en-US"/>
-          </a:p>
-        </p:txBody>
-      </p:sp>
-      <p:sp>
-        <p:nvSpPr>
-          <p:cNvPr id="6" name="Title 1"/>
-          <p:cNvSpPr txBox="1">
-            <a:spLocks/>
-          </p:cNvSpPr>
-          <p:nvPr/>
-        </p:nvSpPr>
-        <p:spPr>
-          <a:xfrm>
-            <a:off x="457200" y="274638"/>
-            <a:ext cx="8229600" cy="1143000"/>
-          </a:xfrm>
-          <a:prstGeom prst="rect">
-            <a:avLst/>
-          </a:prstGeom>
-        </p:spPr>
-        <p:txBody>
-          <a:bodyPr vert="horz" lIns="91440" tIns="45720" rIns="91440" bIns="45720" rtlCol="0" anchor="ctr">
-            <a:normAutofit/>
-          </a:bodyPr>
-          <a:lstStyle>
-            <a:lvl1pPr algn="ctr" defTabSz="914400" rtl="0" eaLnBrk="1" latinLnBrk="0" hangingPunct="1">
-              <a:spcBef>
-                <a:spcPct val="0"/>
-              </a:spcBef>
-              <a:buNone/>
-              <a:defRPr sz="4400" kern="1200">
-                <a:solidFill>
-                  <a:schemeClr val="tx1"/>
-                </a:solidFill>
-                <a:latin typeface="+mj-lt"/>
-                <a:ea typeface="+mj-ea"/>
-                <a:cs typeface="+mj-cs"/>
-              </a:defRPr>
-            </a:lvl1pPr>
-          </a:lstStyle>
-          <a:p>
-            <a:r>
-              <a:rPr lang="de-DE" smtClean="0"/>
-              <a:t>Alien-Ansicht</a:t>
-            </a:r>
-            <a:endParaRPr lang="en-US" dirty="0"/>
-          </a:p>
-        </p:txBody>
-      </p:sp>
-      <p:sp>
-        <p:nvSpPr>
-          <p:cNvPr id="7" name="Footer Placeholder 3"/>
-          <p:cNvSpPr txBox="1">
-            <a:spLocks/>
-          </p:cNvSpPr>
-          <p:nvPr/>
-        </p:nvSpPr>
-        <p:spPr>
-          <a:xfrm>
-            <a:off x="3124200" y="6356350"/>
-            <a:ext cx="2895600" cy="365125"/>
-          </a:xfrm>
-          <a:prstGeom prst="rect">
-            <a:avLst/>
-          </a:prstGeom>
-        </p:spPr>
-        <p:txBody>
-          <a:bodyPr vert="horz" lIns="91440" tIns="45720" rIns="91440" bIns="45720" rtlCol="0" anchor="ctr"/>
-          <a:lstStyle>
-            <a:defPPr>
-              <a:defRPr lang="en-US"/>
-            </a:defPPr>
-            <a:lvl1pPr marL="0" algn="ctr" defTabSz="914400" rtl="0" eaLnBrk="1" latinLnBrk="0" hangingPunct="1">
-              <a:defRPr sz="1200" kern="1200">
-                <a:solidFill>
-                  <a:schemeClr val="tx1">
-                    <a:tint val="75000"/>
-                  </a:schemeClr>
-                </a:solidFill>
-                <a:latin typeface="+mn-lt"/>
-                <a:ea typeface="+mn-ea"/>
-                <a:cs typeface="+mn-cs"/>
-              </a:defRPr>
-            </a:lvl1pPr>
-            <a:lvl2pPr marL="457200" algn="l" defTabSz="914400" rtl="0" eaLnBrk="1" latinLnBrk="0" hangingPunct="1">
-              <a:defRPr sz="1800" kern="1200">
-                <a:solidFill>
-                  <a:schemeClr val="tx1"/>
-                </a:solidFill>
-                <a:latin typeface="+mn-lt"/>
-                <a:ea typeface="+mn-ea"/>
-                <a:cs typeface="+mn-cs"/>
-              </a:defRPr>
-            </a:lvl2pPr>
-            <a:lvl3pPr marL="914400" algn="l" defTabSz="914400" rtl="0" eaLnBrk="1" latinLnBrk="0" hangingPunct="1">
-              <a:defRPr sz="1800" kern="1200">
-                <a:solidFill>
-                  <a:schemeClr val="tx1"/>
-                </a:solidFill>
-                <a:latin typeface="+mn-lt"/>
-                <a:ea typeface="+mn-ea"/>
-                <a:cs typeface="+mn-cs"/>
-              </a:defRPr>
-            </a:lvl3pPr>
-            <a:lvl4pPr marL="1371600" algn="l" defTabSz="914400" rtl="0" eaLnBrk="1" latinLnBrk="0" hangingPunct="1">
-              <a:defRPr sz="1800" kern="1200">
-                <a:solidFill>
-                  <a:schemeClr val="tx1"/>
-                </a:solidFill>
-                <a:latin typeface="+mn-lt"/>
-                <a:ea typeface="+mn-ea"/>
-                <a:cs typeface="+mn-cs"/>
-              </a:defRPr>
-            </a:lvl4pPr>
-            <a:lvl5pPr marL="1828800" algn="l" defTabSz="914400" rtl="0" eaLnBrk="1" latinLnBrk="0" hangingPunct="1">
-              <a:defRPr sz="1800" kern="1200">
-                <a:solidFill>
-                  <a:schemeClr val="tx1"/>
-                </a:solidFill>
-                <a:latin typeface="+mn-lt"/>
-                <a:ea typeface="+mn-ea"/>
-                <a:cs typeface="+mn-cs"/>
-              </a:defRPr>
-            </a:lvl5pPr>
-            <a:lvl6pPr marL="2286000" algn="l" defTabSz="914400" rtl="0" eaLnBrk="1" latinLnBrk="0" hangingPunct="1">
-              <a:defRPr sz="1800" kern="1200">
-                <a:solidFill>
-                  <a:schemeClr val="tx1"/>
-                </a:solidFill>
-                <a:latin typeface="+mn-lt"/>
-                <a:ea typeface="+mn-ea"/>
-                <a:cs typeface="+mn-cs"/>
-              </a:defRPr>
-            </a:lvl6pPr>
-            <a:lvl7pPr marL="2743200" algn="l" defTabSz="914400" rtl="0" eaLnBrk="1" latinLnBrk="0" hangingPunct="1">
-              <a:defRPr sz="1800" kern="1200">
-                <a:solidFill>
-                  <a:schemeClr val="tx1"/>
-                </a:solidFill>
-                <a:latin typeface="+mn-lt"/>
-                <a:ea typeface="+mn-ea"/>
-                <a:cs typeface="+mn-cs"/>
-              </a:defRPr>
-            </a:lvl7pPr>
-            <a:lvl8pPr marL="3200400" algn="l" defTabSz="914400" rtl="0" eaLnBrk="1" latinLnBrk="0" hangingPunct="1">
-              <a:defRPr sz="1800" kern="1200">
-                <a:solidFill>
-                  <a:schemeClr val="tx1"/>
-                </a:solidFill>
-                <a:latin typeface="+mn-lt"/>
-                <a:ea typeface="+mn-ea"/>
-                <a:cs typeface="+mn-cs"/>
-              </a:defRPr>
-            </a:lvl8pPr>
-            <a:lvl9pPr marL="3657600" algn="l" defTabSz="914400" rtl="0" eaLnBrk="1" latinLnBrk="0" hangingPunct="1">
-              <a:defRPr sz="1800" kern="1200">
-                <a:solidFill>
-                  <a:schemeClr val="tx1"/>
-                </a:solidFill>
-                <a:latin typeface="+mn-lt"/>
-                <a:ea typeface="+mn-ea"/>
-                <a:cs typeface="+mn-cs"/>
-              </a:defRPr>
-            </a:lvl9pPr>
-          </a:lstStyle>
-          <a:p>
-            <a:r>
-              <a:rPr lang="en-US" smtClean="0"/>
-              <a:t>Projektseminar GameLab 2014</a:t>
-            </a:r>
-            <a:endParaRPr lang="en-US"/>
-          </a:p>
-        </p:txBody>
-      </p:sp>
-      <p:sp>
-        <p:nvSpPr>
-          <p:cNvPr id="8" name="Slide Number Placeholder 4"/>
-          <p:cNvSpPr txBox="1">
-            <a:spLocks/>
-          </p:cNvSpPr>
-          <p:nvPr/>
-        </p:nvSpPr>
-        <p:spPr>
-          <a:xfrm>
-            <a:off x="6553200" y="6356350"/>
-            <a:ext cx="2133600" cy="365125"/>
-          </a:xfrm>
-          <a:prstGeom prst="rect">
-            <a:avLst/>
-          </a:prstGeom>
-        </p:spPr>
-        <p:txBody>
-          <a:bodyPr vert="horz" lIns="91440" tIns="45720" rIns="91440" bIns="45720" rtlCol="0" anchor="ctr"/>
-          <a:lstStyle>
-            <a:defPPr>
-              <a:defRPr lang="en-US"/>
-            </a:defPPr>
-            <a:lvl1pPr marL="0" algn="r" defTabSz="914400" rtl="0" eaLnBrk="1" latinLnBrk="0" hangingPunct="1">
-              <a:defRPr sz="1200" kern="1200">
-                <a:solidFill>
-                  <a:schemeClr val="tx1">
-                    <a:tint val="75000"/>
-                  </a:schemeClr>
-                </a:solidFill>
-                <a:latin typeface="+mn-lt"/>
-                <a:ea typeface="+mn-ea"/>
-                <a:cs typeface="+mn-cs"/>
-              </a:defRPr>
-            </a:lvl1pPr>
-            <a:lvl2pPr marL="457200" algn="l" defTabSz="914400" rtl="0" eaLnBrk="1" latinLnBrk="0" hangingPunct="1">
-              <a:defRPr sz="1800" kern="1200">
-                <a:solidFill>
-                  <a:schemeClr val="tx1"/>
-                </a:solidFill>
-                <a:latin typeface="+mn-lt"/>
-                <a:ea typeface="+mn-ea"/>
-                <a:cs typeface="+mn-cs"/>
-              </a:defRPr>
-            </a:lvl2pPr>
-            <a:lvl3pPr marL="914400" algn="l" defTabSz="914400" rtl="0" eaLnBrk="1" latinLnBrk="0" hangingPunct="1">
-              <a:defRPr sz="1800" kern="1200">
-                <a:solidFill>
-                  <a:schemeClr val="tx1"/>
-                </a:solidFill>
-                <a:latin typeface="+mn-lt"/>
-                <a:ea typeface="+mn-ea"/>
-                <a:cs typeface="+mn-cs"/>
-              </a:defRPr>
-            </a:lvl3pPr>
-            <a:lvl4pPr marL="1371600" algn="l" defTabSz="914400" rtl="0" eaLnBrk="1" latinLnBrk="0" hangingPunct="1">
-              <a:defRPr sz="1800" kern="1200">
-                <a:solidFill>
-                  <a:schemeClr val="tx1"/>
-                </a:solidFill>
-                <a:latin typeface="+mn-lt"/>
-                <a:ea typeface="+mn-ea"/>
-                <a:cs typeface="+mn-cs"/>
-              </a:defRPr>
-            </a:lvl4pPr>
-            <a:lvl5pPr marL="1828800" algn="l" defTabSz="914400" rtl="0" eaLnBrk="1" latinLnBrk="0" hangingPunct="1">
-              <a:defRPr sz="1800" kern="1200">
-                <a:solidFill>
-                  <a:schemeClr val="tx1"/>
-                </a:solidFill>
-                <a:latin typeface="+mn-lt"/>
-                <a:ea typeface="+mn-ea"/>
-                <a:cs typeface="+mn-cs"/>
-              </a:defRPr>
-            </a:lvl5pPr>
-            <a:lvl6pPr marL="2286000" algn="l" defTabSz="914400" rtl="0" eaLnBrk="1" latinLnBrk="0" hangingPunct="1">
-              <a:defRPr sz="1800" kern="1200">
-                <a:solidFill>
-                  <a:schemeClr val="tx1"/>
-                </a:solidFill>
-                <a:latin typeface="+mn-lt"/>
-                <a:ea typeface="+mn-ea"/>
-                <a:cs typeface="+mn-cs"/>
-              </a:defRPr>
-            </a:lvl6pPr>
-            <a:lvl7pPr marL="2743200" algn="l" defTabSz="914400" rtl="0" eaLnBrk="1" latinLnBrk="0" hangingPunct="1">
-              <a:defRPr sz="1800" kern="1200">
-                <a:solidFill>
-                  <a:schemeClr val="tx1"/>
-                </a:solidFill>
-                <a:latin typeface="+mn-lt"/>
-                <a:ea typeface="+mn-ea"/>
-                <a:cs typeface="+mn-cs"/>
-              </a:defRPr>
-            </a:lvl7pPr>
-            <a:lvl8pPr marL="3200400" algn="l" defTabSz="914400" rtl="0" eaLnBrk="1" latinLnBrk="0" hangingPunct="1">
-              <a:defRPr sz="1800" kern="1200">
-                <a:solidFill>
-                  <a:schemeClr val="tx1"/>
-                </a:solidFill>
-                <a:latin typeface="+mn-lt"/>
-                <a:ea typeface="+mn-ea"/>
-                <a:cs typeface="+mn-cs"/>
-              </a:defRPr>
-            </a:lvl8pPr>
-            <a:lvl9pPr marL="3657600" algn="l" defTabSz="914400" rtl="0" eaLnBrk="1" latinLnBrk="0" hangingPunct="1">
-              <a:defRPr sz="1800" kern="1200">
-                <a:solidFill>
-                  <a:schemeClr val="tx1"/>
-                </a:solidFill>
-                <a:latin typeface="+mn-lt"/>
-                <a:ea typeface="+mn-ea"/>
-                <a:cs typeface="+mn-cs"/>
-              </a:defRPr>
-            </a:lvl9pPr>
-          </a:lstStyle>
-          <a:p>
-            <a:fld id="{6745021C-5F18-4753-8082-8C4943AC116D}" type="slidenum">
-              <a:rPr lang="en-US" smtClean="0"/>
-              <a:pPr/>
-              <a:t>15</a:t>
-            </a:fld>
-            <a:endParaRPr lang="en-US"/>
-          </a:p>
-        </p:txBody>
-      </p:sp>
-      <p:pic>
-        <p:nvPicPr>
-          <p:cNvPr id="9" name="Picture 2" descr="D:\Daten\Programmierumgebungen\GameLab\Alien-Gruppe\HUD Elemente\AlienAnsicht.png"/>
-          <p:cNvPicPr>
-            <a:picLocks noChangeAspect="1" noChangeArrowheads="1"/>
-          </p:cNvPicPr>
-          <p:nvPr/>
-        </p:nvPicPr>
-        <p:blipFill>
-          <a:blip r:embed="rId2">
-            <a:extLst>
-              <a:ext uri="{28A0092B-C50C-407E-A947-70E740481C1C}">
-                <a14:useLocalDpi xmlns:a14="http://schemas.microsoft.com/office/drawing/2010/main" val="0"/>
-              </a:ext>
-            </a:extLst>
-          </a:blip>
-          <a:srcRect/>
-          <a:stretch>
-            <a:fillRect/>
-          </a:stretch>
-        </p:blipFill>
-        <p:spPr bwMode="auto">
-          <a:xfrm>
-            <a:off x="1043608" y="1196752"/>
-            <a:ext cx="7488237" cy="4949577"/>
-          </a:xfrm>
-          <a:prstGeom prst="rect">
-            <a:avLst/>
-          </a:prstGeom>
-          <a:noFill/>
-          <a:extLst>
-            <a:ext uri="{909E8E84-426E-40DD-AFC4-6F175D3DCCD1}">
-              <a14:hiddenFill xmlns:a14="http://schemas.microsoft.com/office/drawing/2010/main">
-                <a:solidFill>
-                  <a:srgbClr val="FFFFFF"/>
-                </a:solidFill>
-              </a14:hiddenFill>
-            </a:ext>
-          </a:extLst>
-        </p:spPr>
-      </p:pic>
-    </p:spTree>
-    <p:extLst>
-      <p:ext uri="{BB962C8B-B14F-4D97-AF65-F5344CB8AC3E}">
-        <p14:creationId xmlns:p14="http://schemas.microsoft.com/office/powerpoint/2010/main" val="4154991409"/>
-      </p:ext>
-    </p:extLst>
-  </p:cSld>
-  <p:clrMapOvr>
-    <a:masterClrMapping/>
-  </p:clrMapOvr>
-</p:sld>
-</file>
-
-<file path=ppt/slides/slide16.xml><?xml version="1.0" encoding="utf-8"?>
-<p:sld xmlns:a="http://schemas.openxmlformats.org/drawingml/2006/main" xmlns:r="http://schemas.openxmlformats.org/officeDocument/2006/relationships" xmlns:p="http://schemas.openxmlformats.org/presentationml/2006/main">
-  <p:cSld>
-    <p:spTree>
-      <p:nvGrpSpPr>
-        <p:cNvPr id="1" name=""/>
-        <p:cNvGrpSpPr/>
-        <p:nvPr/>
-      </p:nvGrpSpPr>
-      <p:grpSpPr>
-        <a:xfrm>
-          <a:off x="0" y="0"/>
-          <a:ext cx="0" cy="0"/>
-          <a:chOff x="0" y="0"/>
-          <a:chExt cx="0" cy="0"/>
-        </a:xfrm>
-      </p:grpSpPr>
-      <p:sp>
-        <p:nvSpPr>
-          <p:cNvPr id="10" name="Title 1"/>
-          <p:cNvSpPr>
-            <a:spLocks noGrp="1"/>
-          </p:cNvSpPr>
-          <p:nvPr>
-            <p:ph type="title"/>
-          </p:nvPr>
-        </p:nvSpPr>
-        <p:spPr>
-          <a:xfrm>
-            <a:off x="457200" y="274638"/>
-            <a:ext cx="8229600" cy="1143000"/>
-          </a:xfrm>
-        </p:spPr>
-        <p:txBody>
-          <a:bodyPr/>
-          <a:lstStyle/>
-          <a:p>
-            <a:r>
-              <a:rPr lang="de-DE" dirty="0" smtClean="0"/>
-              <a:t>Alien: Ansichtselemente</a:t>
-            </a:r>
-            <a:endParaRPr lang="en-US" dirty="0"/>
-          </a:p>
-        </p:txBody>
-      </p:sp>
-      <p:sp>
-        <p:nvSpPr>
-          <p:cNvPr id="11" name="Content Placeholder 2"/>
-          <p:cNvSpPr>
-            <a:spLocks noGrp="1"/>
-          </p:cNvSpPr>
-          <p:nvPr>
-            <p:ph idx="1"/>
-          </p:nvPr>
-        </p:nvSpPr>
-        <p:spPr>
-          <a:xfrm>
-            <a:off x="457200" y="1600200"/>
-            <a:ext cx="8229600" cy="4525963"/>
-          </a:xfrm>
-        </p:spPr>
-        <p:txBody>
-          <a:bodyPr>
-            <a:normAutofit fontScale="85000" lnSpcReduction="20000"/>
-          </a:bodyPr>
-          <a:lstStyle/>
-          <a:p>
-            <a:pPr lvl="1"/>
-            <a:r>
-              <a:rPr lang="de-DE" dirty="0" smtClean="0"/>
-              <a:t>Menu</a:t>
-            </a:r>
-          </a:p>
-          <a:p>
-            <a:pPr lvl="1"/>
-            <a:r>
-              <a:rPr lang="de-DE" dirty="0" smtClean="0"/>
-              <a:t>Anzahl der aktiven Aliens in der </a:t>
-            </a:r>
-            <a:r>
-              <a:rPr lang="de-DE" dirty="0" err="1" smtClean="0"/>
-              <a:t>Map</a:t>
-            </a:r>
-            <a:endParaRPr lang="de-DE" dirty="0" smtClean="0"/>
-          </a:p>
-          <a:p>
-            <a:pPr lvl="1"/>
-            <a:r>
-              <a:rPr lang="de-DE" dirty="0" smtClean="0"/>
-              <a:t>Anzahl der verfügbaren Aliens</a:t>
-            </a:r>
-          </a:p>
-          <a:p>
-            <a:pPr lvl="1"/>
-            <a:r>
-              <a:rPr lang="de-DE" dirty="0" smtClean="0"/>
-              <a:t>Anzahl der verfügbaren Rotationen</a:t>
-            </a:r>
-          </a:p>
-          <a:p>
-            <a:pPr lvl="1"/>
-            <a:r>
-              <a:rPr lang="de-DE" dirty="0" smtClean="0"/>
-              <a:t>Anzahl der verfügbaren Stromabschaltungen</a:t>
-            </a:r>
-          </a:p>
-          <a:p>
-            <a:pPr lvl="1"/>
-            <a:r>
-              <a:rPr lang="de-DE" dirty="0" smtClean="0"/>
-              <a:t>Erfahrungspunkte</a:t>
-            </a:r>
-          </a:p>
-          <a:p>
-            <a:pPr lvl="1"/>
-            <a:r>
-              <a:rPr lang="de-DE" dirty="0" smtClean="0"/>
-              <a:t>Raumwechsel</a:t>
-            </a:r>
-          </a:p>
-          <a:p>
-            <a:pPr lvl="1"/>
-            <a:endParaRPr lang="de-DE" dirty="0"/>
-          </a:p>
-          <a:p>
-            <a:pPr lvl="1"/>
-            <a:r>
-              <a:rPr lang="de-DE" dirty="0" smtClean="0"/>
-              <a:t>Ansicht der Mini-</a:t>
-            </a:r>
-            <a:r>
-              <a:rPr lang="de-DE" dirty="0" err="1" smtClean="0"/>
-              <a:t>Map</a:t>
-            </a:r>
-            <a:endParaRPr lang="de-DE" dirty="0"/>
-          </a:p>
-          <a:p>
-            <a:pPr lvl="2"/>
-            <a:r>
-              <a:rPr lang="de-DE" dirty="0" smtClean="0"/>
-              <a:t>Grüne Punkte: </a:t>
-            </a:r>
-            <a:r>
-              <a:rPr lang="de-DE" dirty="0" err="1" smtClean="0"/>
-              <a:t>AlienSpawner</a:t>
-            </a:r>
-            <a:endParaRPr lang="de-DE" dirty="0" smtClean="0"/>
-          </a:p>
-          <a:p>
-            <a:pPr lvl="2"/>
-            <a:r>
-              <a:rPr lang="de-DE" dirty="0" smtClean="0"/>
-              <a:t>Gelbe Punkte: Alien</a:t>
-            </a:r>
-          </a:p>
-          <a:p>
-            <a:pPr lvl="2"/>
-            <a:r>
-              <a:rPr lang="de-DE" dirty="0" smtClean="0"/>
-              <a:t>Rote Punkte: </a:t>
-            </a:r>
-            <a:r>
-              <a:rPr lang="de-DE" dirty="0" err="1" smtClean="0"/>
-              <a:t>Alienangriffe</a:t>
-            </a:r>
-            <a:r>
-              <a:rPr lang="de-DE" dirty="0" smtClean="0"/>
-              <a:t>/Terminalzugriffe</a:t>
-            </a:r>
-            <a:endParaRPr lang="en-US" dirty="0"/>
-          </a:p>
-        </p:txBody>
-      </p:sp>
-      <p:sp>
-        <p:nvSpPr>
-          <p:cNvPr id="12" name="Footer Placeholder 3"/>
-          <p:cNvSpPr>
-            <a:spLocks noGrp="1"/>
-          </p:cNvSpPr>
-          <p:nvPr>
-            <p:ph type="ftr" sz="quarter" idx="11"/>
-          </p:nvPr>
-        </p:nvSpPr>
-        <p:spPr>
-          <a:xfrm>
-            <a:off x="3124200" y="6356350"/>
-            <a:ext cx="2895600" cy="365125"/>
-          </a:xfrm>
-        </p:spPr>
-        <p:txBody>
-          <a:bodyPr/>
-          <a:lstStyle/>
-          <a:p>
-            <a:r>
-              <a:rPr lang="en-US" smtClean="0"/>
-              <a:t>Projektseminar GameLab 2014</a:t>
-            </a:r>
-            <a:endParaRPr lang="en-US"/>
-          </a:p>
-        </p:txBody>
-      </p:sp>
-      <p:sp>
-        <p:nvSpPr>
-          <p:cNvPr id="13" name="Slide Number Placeholder 4"/>
-          <p:cNvSpPr>
-            <a:spLocks noGrp="1"/>
-          </p:cNvSpPr>
-          <p:nvPr>
-            <p:ph type="sldNum" sz="quarter" idx="12"/>
-          </p:nvPr>
-        </p:nvSpPr>
-        <p:spPr>
-          <a:xfrm>
-            <a:off x="6553200" y="6356350"/>
-            <a:ext cx="2133600" cy="365125"/>
-          </a:xfrm>
-        </p:spPr>
-        <p:txBody>
-          <a:bodyPr/>
-          <a:lstStyle/>
-          <a:p>
-            <a:fld id="{6745021C-5F18-4753-8082-8C4943AC116D}" type="slidenum">
-              <a:rPr lang="en-US" smtClean="0"/>
-              <a:pPr/>
-              <a:t>16</a:t>
-            </a:fld>
-            <a:endParaRPr lang="en-US"/>
-          </a:p>
-        </p:txBody>
-      </p:sp>
-      <p:pic>
-        <p:nvPicPr>
-          <p:cNvPr id="14" name="Picture 2" descr="D:\Daten\Programmierumgebungen\GameLab\Alien-Gruppe\HUD Elemente\Strahlen.png"/>
-          <p:cNvPicPr>
-            <a:picLocks noChangeAspect="1" noChangeArrowheads="1"/>
-          </p:cNvPicPr>
-          <p:nvPr/>
-        </p:nvPicPr>
-        <p:blipFill>
-          <a:blip r:embed="rId2">
-            <a:extLst>
-              <a:ext uri="{28A0092B-C50C-407E-A947-70E740481C1C}">
-                <a14:useLocalDpi xmlns:a14="http://schemas.microsoft.com/office/drawing/2010/main" val="0"/>
-              </a:ext>
-            </a:extLst>
-          </a:blip>
-          <a:srcRect/>
-          <a:stretch>
-            <a:fillRect/>
-          </a:stretch>
-        </p:blipFill>
-        <p:spPr bwMode="auto">
-          <a:xfrm>
-            <a:off x="6876256" y="1340768"/>
-            <a:ext cx="1870040" cy="1696609"/>
-          </a:xfrm>
-          <a:prstGeom prst="rect">
-            <a:avLst/>
-          </a:prstGeom>
-          <a:noFill/>
-          <a:extLst>
-            <a:ext uri="{909E8E84-426E-40DD-AFC4-6F175D3DCCD1}">
-              <a14:hiddenFill xmlns:a14="http://schemas.microsoft.com/office/drawing/2010/main">
-                <a:solidFill>
-                  <a:srgbClr val="FFFFFF"/>
-                </a:solidFill>
-              </a14:hiddenFill>
-            </a:ext>
-          </a:extLst>
-        </p:spPr>
-      </p:pic>
-      <p:pic>
-        <p:nvPicPr>
-          <p:cNvPr id="15" name="Picture 7" descr="D:\Daten\Programmierumgebungen\GameLab\Alien-Gruppe\HUD Elemente\Radar.png"/>
-          <p:cNvPicPr>
-            <a:picLocks noChangeAspect="1" noChangeArrowheads="1"/>
-          </p:cNvPicPr>
-          <p:nvPr/>
-        </p:nvPicPr>
-        <p:blipFill>
-          <a:blip r:embed="rId3">
-            <a:extLst>
-              <a:ext uri="{28A0092B-C50C-407E-A947-70E740481C1C}">
-                <a14:useLocalDpi xmlns:a14="http://schemas.microsoft.com/office/drawing/2010/main" val="0"/>
-              </a:ext>
-            </a:extLst>
-          </a:blip>
-          <a:srcRect/>
-          <a:stretch>
-            <a:fillRect/>
-          </a:stretch>
-        </p:blipFill>
-        <p:spPr bwMode="auto">
-          <a:xfrm>
-            <a:off x="6956986" y="4509119"/>
-            <a:ext cx="1789310" cy="1696609"/>
-          </a:xfrm>
-          <a:prstGeom prst="rect">
-            <a:avLst/>
-          </a:prstGeom>
-          <a:noFill/>
-          <a:extLst>
-            <a:ext uri="{909E8E84-426E-40DD-AFC4-6F175D3DCCD1}">
-              <a14:hiddenFill xmlns:a14="http://schemas.microsoft.com/office/drawing/2010/main">
-                <a:solidFill>
-                  <a:srgbClr val="FFFFFF"/>
-                </a:solidFill>
-              </a14:hiddenFill>
-            </a:ext>
-          </a:extLst>
-        </p:spPr>
-      </p:pic>
-    </p:spTree>
-    <p:extLst>
-      <p:ext uri="{BB962C8B-B14F-4D97-AF65-F5344CB8AC3E}">
-        <p14:creationId xmlns:p14="http://schemas.microsoft.com/office/powerpoint/2010/main" val="1218880395"/>
-      </p:ext>
-    </p:extLst>
-  </p:cSld>
-  <p:clrMapOvr>
-    <a:masterClrMapping/>
-  </p:clrMapOvr>
-</p:sld>
-</file>
-
-<file path=ppt/slides/slide17.xml><?xml version="1.0" encoding="utf-8"?>
-<p:sld xmlns:a="http://schemas.openxmlformats.org/drawingml/2006/main" xmlns:r="http://schemas.openxmlformats.org/officeDocument/2006/relationships" xmlns:p="http://schemas.openxmlformats.org/presentationml/2006/main">
-  <p:cSld>
-    <p:spTree>
-      <p:nvGrpSpPr>
-        <p:cNvPr id="1" name=""/>
-        <p:cNvGrpSpPr/>
-        <p:nvPr/>
-      </p:nvGrpSpPr>
-      <p:grpSpPr>
-        <a:xfrm>
-          <a:off x="0" y="0"/>
-          <a:ext cx="0" cy="0"/>
-          <a:chOff x="0" y="0"/>
-          <a:chExt cx="0" cy="0"/>
-        </a:xfrm>
-      </p:grpSpPr>
-      <p:sp>
-        <p:nvSpPr>
-          <p:cNvPr id="2" name="Title 1"/>
-          <p:cNvSpPr>
-            <a:spLocks noGrp="1"/>
-          </p:cNvSpPr>
-          <p:nvPr>
-            <p:ph type="title"/>
-          </p:nvPr>
-        </p:nvSpPr>
-        <p:spPr>
-          <a:xfrm>
-            <a:off x="457200" y="274638"/>
-            <a:ext cx="8229600" cy="1143000"/>
-          </a:xfrm>
-        </p:spPr>
-        <p:txBody>
-          <a:bodyPr/>
-          <a:lstStyle/>
-          <a:p>
-            <a:r>
-              <a:rPr lang="de-DE" dirty="0" smtClean="0"/>
-              <a:t>Alien: Navigation</a:t>
-            </a:r>
-            <a:endParaRPr lang="en-US" dirty="0"/>
-          </a:p>
-        </p:txBody>
-      </p:sp>
-      <p:sp>
-        <p:nvSpPr>
-          <p:cNvPr id="3" name="Footer Placeholder 3"/>
-          <p:cNvSpPr>
-            <a:spLocks noGrp="1"/>
-          </p:cNvSpPr>
-          <p:nvPr>
-            <p:ph type="ftr" sz="quarter" idx="11"/>
-          </p:nvPr>
-        </p:nvSpPr>
-        <p:spPr>
-          <a:xfrm>
-            <a:off x="3124200" y="6356350"/>
-            <a:ext cx="2895600" cy="365125"/>
-          </a:xfrm>
-        </p:spPr>
-        <p:txBody>
-          <a:bodyPr/>
-          <a:lstStyle/>
-          <a:p>
-            <a:r>
-              <a:rPr lang="en-US" smtClean="0"/>
-              <a:t>Projektseminar GameLab 2014</a:t>
-            </a:r>
-            <a:endParaRPr lang="en-US"/>
-          </a:p>
-        </p:txBody>
-      </p:sp>
-      <p:sp>
-        <p:nvSpPr>
-          <p:cNvPr id="4" name="Slide Number Placeholder 4"/>
-          <p:cNvSpPr>
-            <a:spLocks noGrp="1"/>
-          </p:cNvSpPr>
-          <p:nvPr>
-            <p:ph type="sldNum" sz="quarter" idx="12"/>
-          </p:nvPr>
-        </p:nvSpPr>
-        <p:spPr>
-          <a:xfrm>
-            <a:off x="6553200" y="6356350"/>
-            <a:ext cx="2133600" cy="365125"/>
-          </a:xfrm>
-        </p:spPr>
-        <p:txBody>
-          <a:bodyPr/>
-          <a:lstStyle/>
-          <a:p>
-            <a:fld id="{6745021C-5F18-4753-8082-8C4943AC116D}" type="slidenum">
-              <a:rPr lang="en-US" smtClean="0"/>
-              <a:pPr/>
-              <a:t>17</a:t>
-            </a:fld>
-            <a:endParaRPr lang="en-US"/>
-          </a:p>
-        </p:txBody>
-      </p:sp>
-      <p:pic>
-        <p:nvPicPr>
-          <p:cNvPr id="5" name="Picture 2" descr="D:\Daten\Programmierumgebungen\GameLab\Alien-Gruppe\HUD Elemente\GestenNavigation.png"/>
-          <p:cNvPicPr>
-            <a:picLocks noChangeAspect="1" noChangeArrowheads="1"/>
-          </p:cNvPicPr>
-          <p:nvPr/>
-        </p:nvPicPr>
-        <p:blipFill rotWithShape="1">
-          <a:blip r:embed="rId2">
-            <a:extLst>
-              <a:ext uri="{28A0092B-C50C-407E-A947-70E740481C1C}">
-                <a14:useLocalDpi xmlns:a14="http://schemas.microsoft.com/office/drawing/2010/main" val="0"/>
-              </a:ext>
-            </a:extLst>
-          </a:blip>
-          <a:srcRect l="14598" t="22442" r="11631" b="5836"/>
-          <a:stretch/>
-        </p:blipFill>
-        <p:spPr bwMode="auto">
-          <a:xfrm>
-            <a:off x="2411760" y="1988840"/>
-            <a:ext cx="4320480" cy="4160520"/>
-          </a:xfrm>
-          <a:prstGeom prst="rect">
-            <a:avLst/>
-          </a:prstGeom>
-          <a:noFill/>
-          <a:extLst>
-            <a:ext uri="{909E8E84-426E-40DD-AFC4-6F175D3DCCD1}">
-              <a14:hiddenFill xmlns:a14="http://schemas.microsoft.com/office/drawing/2010/main">
-                <a:solidFill>
-                  <a:srgbClr val="FFFFFF"/>
-                </a:solidFill>
-              </a14:hiddenFill>
-            </a:ext>
-          </a:extLst>
-        </p:spPr>
-      </p:pic>
-    </p:spTree>
-    <p:extLst>
-      <p:ext uri="{BB962C8B-B14F-4D97-AF65-F5344CB8AC3E}">
-        <p14:creationId xmlns:p14="http://schemas.microsoft.com/office/powerpoint/2010/main" val="2486265930"/>
-      </p:ext>
-    </p:extLst>
-  </p:cSld>
-  <p:clrMapOvr>
-    <a:masterClrMapping/>
-  </p:clrMapOvr>
-</p:sld>
-</file>
-
-<file path=ppt/slides/slide18.xml><?xml version="1.0" encoding="utf-8"?>
-<p:sld xmlns:a="http://schemas.openxmlformats.org/drawingml/2006/main" xmlns:r="http://schemas.openxmlformats.org/officeDocument/2006/relationships" xmlns:p="http://schemas.openxmlformats.org/presentationml/2006/main">
-  <p:cSld>
-    <p:spTree>
-      <p:nvGrpSpPr>
-        <p:cNvPr id="1" name=""/>
-        <p:cNvGrpSpPr/>
-        <p:nvPr/>
-      </p:nvGrpSpPr>
-      <p:grpSpPr>
-        <a:xfrm>
-          <a:off x="0" y="0"/>
-          <a:ext cx="0" cy="0"/>
-          <a:chOff x="0" y="0"/>
-          <a:chExt cx="0" cy="0"/>
-        </a:xfrm>
-      </p:grpSpPr>
-      <p:sp>
-        <p:nvSpPr>
-          <p:cNvPr id="2" name="Title 1"/>
-          <p:cNvSpPr>
-            <a:spLocks noGrp="1"/>
-          </p:cNvSpPr>
-          <p:nvPr>
-            <p:ph type="title"/>
-          </p:nvPr>
-        </p:nvSpPr>
-        <p:spPr>
-          <a:xfrm>
-            <a:off x="457200" y="274638"/>
-            <a:ext cx="8229600" cy="1143000"/>
-          </a:xfrm>
-        </p:spPr>
-        <p:txBody>
-          <a:bodyPr/>
-          <a:lstStyle/>
-          <a:p>
-            <a:r>
-              <a:rPr lang="de-DE" dirty="0" smtClean="0"/>
-              <a:t>Alien: Steuerelemente</a:t>
-            </a:r>
-            <a:endParaRPr lang="en-US" dirty="0"/>
-          </a:p>
-        </p:txBody>
-      </p:sp>
-      <p:sp>
-        <p:nvSpPr>
-          <p:cNvPr id="3" name="Content Placeholder 2"/>
-          <p:cNvSpPr>
-            <a:spLocks noGrp="1"/>
-          </p:cNvSpPr>
-          <p:nvPr>
-            <p:ph idx="1"/>
-          </p:nvPr>
-        </p:nvSpPr>
-        <p:spPr>
-          <a:xfrm>
-            <a:off x="457200" y="1600200"/>
-            <a:ext cx="8229600" cy="4525963"/>
-          </a:xfrm>
-        </p:spPr>
-        <p:txBody>
-          <a:bodyPr>
-            <a:normAutofit fontScale="85000" lnSpcReduction="20000"/>
-          </a:bodyPr>
-          <a:lstStyle/>
-          <a:p>
-            <a:r>
-              <a:rPr lang="de-DE" dirty="0" smtClean="0"/>
-              <a:t>Wenn Alien ausgewählt wurde, </a:t>
-            </a:r>
-            <a:r>
-              <a:rPr lang="de-DE" dirty="0"/>
-              <a:t>wird </a:t>
-            </a:r>
-            <a:r>
-              <a:rPr lang="de-DE" dirty="0" smtClean="0"/>
-              <a:t>folgendes angezeigt:</a:t>
-            </a:r>
-          </a:p>
-          <a:p>
-            <a:pPr marL="2149475" lvl="1"/>
-            <a:r>
-              <a:rPr lang="de-DE" dirty="0" smtClean="0"/>
-              <a:t>Linke Seite:</a:t>
-            </a:r>
-          </a:p>
-          <a:p>
-            <a:pPr marL="2549525" lvl="2"/>
-            <a:r>
-              <a:rPr lang="de-DE" dirty="0" smtClean="0"/>
-              <a:t>Anzahl der ausgewählten Aliens</a:t>
-            </a:r>
-          </a:p>
-          <a:p>
-            <a:pPr marL="2320925" lvl="2" indent="0">
-              <a:buNone/>
-            </a:pPr>
-            <a:r>
-              <a:rPr lang="de-DE" dirty="0" smtClean="0"/>
-              <a:t>	(Maximal 10 Anzeigen)</a:t>
-            </a:r>
-          </a:p>
-          <a:p>
-            <a:pPr marL="914400" lvl="2" indent="0">
-              <a:buNone/>
-            </a:pPr>
-            <a:endParaRPr lang="de-DE" dirty="0" smtClean="0"/>
-          </a:p>
-          <a:p>
-            <a:pPr marL="914400" lvl="2" indent="0">
-              <a:buNone/>
-            </a:pPr>
-            <a:endParaRPr lang="de-DE" dirty="0" smtClean="0"/>
-          </a:p>
-          <a:p>
-            <a:pPr lvl="1"/>
-            <a:r>
-              <a:rPr lang="de-DE" dirty="0" smtClean="0"/>
-              <a:t>Rechte Seite:</a:t>
-            </a:r>
-          </a:p>
-          <a:p>
-            <a:pPr lvl="2"/>
-            <a:r>
-              <a:rPr lang="de-DE" dirty="0" smtClean="0"/>
-              <a:t>Bewegen</a:t>
-            </a:r>
-          </a:p>
-          <a:p>
-            <a:pPr lvl="2"/>
-            <a:r>
-              <a:rPr lang="de-DE" dirty="0" err="1" smtClean="0"/>
-              <a:t>Patroullieren</a:t>
-            </a:r>
-            <a:endParaRPr lang="de-DE" dirty="0" smtClean="0"/>
-          </a:p>
-          <a:p>
-            <a:pPr lvl="2"/>
-            <a:r>
-              <a:rPr lang="de-DE" dirty="0" smtClean="0"/>
-              <a:t>Selbstmord</a:t>
-            </a:r>
-          </a:p>
-          <a:p>
-            <a:pPr lvl="2"/>
-            <a:r>
-              <a:rPr lang="de-DE" dirty="0" smtClean="0"/>
-              <a:t>Angreifen</a:t>
-            </a:r>
-          </a:p>
-          <a:p>
-            <a:pPr lvl="2"/>
-            <a:r>
-              <a:rPr lang="de-DE" dirty="0" err="1" smtClean="0"/>
-              <a:t>Stop</a:t>
-            </a:r>
-            <a:endParaRPr lang="de-DE" dirty="0" smtClean="0"/>
-          </a:p>
-          <a:p>
-            <a:pPr lvl="1"/>
-            <a:endParaRPr lang="en-US" dirty="0"/>
-          </a:p>
-        </p:txBody>
-      </p:sp>
-      <p:sp>
-        <p:nvSpPr>
-          <p:cNvPr id="4" name="Footer Placeholder 3"/>
-          <p:cNvSpPr>
-            <a:spLocks noGrp="1"/>
-          </p:cNvSpPr>
-          <p:nvPr>
-            <p:ph type="ftr" sz="quarter" idx="11"/>
-          </p:nvPr>
-        </p:nvSpPr>
-        <p:spPr>
-          <a:xfrm>
-            <a:off x="3124200" y="6356350"/>
-            <a:ext cx="2895600" cy="365125"/>
-          </a:xfrm>
-        </p:spPr>
-        <p:txBody>
-          <a:bodyPr/>
-          <a:lstStyle/>
-          <a:p>
-            <a:r>
-              <a:rPr lang="en-US" dirty="0" err="1" smtClean="0"/>
-              <a:t>Projektseminar</a:t>
-            </a:r>
-            <a:r>
-              <a:rPr lang="en-US" dirty="0" smtClean="0"/>
-              <a:t> </a:t>
-            </a:r>
-            <a:r>
-              <a:rPr lang="en-US" dirty="0" err="1" smtClean="0"/>
-              <a:t>GameLab</a:t>
-            </a:r>
-            <a:r>
-              <a:rPr lang="en-US" dirty="0" smtClean="0"/>
-              <a:t> 2014</a:t>
-            </a:r>
-            <a:endParaRPr lang="en-US" dirty="0"/>
-          </a:p>
-        </p:txBody>
-      </p:sp>
-      <p:sp>
-        <p:nvSpPr>
-          <p:cNvPr id="5" name="Slide Number Placeholder 4"/>
-          <p:cNvSpPr>
-            <a:spLocks noGrp="1"/>
-          </p:cNvSpPr>
-          <p:nvPr>
-            <p:ph type="sldNum" sz="quarter" idx="12"/>
-          </p:nvPr>
-        </p:nvSpPr>
-        <p:spPr>
-          <a:xfrm>
-            <a:off x="6553200" y="6356350"/>
-            <a:ext cx="2133600" cy="365125"/>
-          </a:xfrm>
-        </p:spPr>
-        <p:txBody>
-          <a:bodyPr/>
-          <a:lstStyle/>
-          <a:p>
-            <a:fld id="{6745021C-5F18-4753-8082-8C4943AC116D}" type="slidenum">
-              <a:rPr lang="en-US" smtClean="0"/>
-              <a:pPr/>
-              <a:t>18</a:t>
-            </a:fld>
-            <a:endParaRPr lang="en-US"/>
-          </a:p>
-        </p:txBody>
-      </p:sp>
-      <p:pic>
-        <p:nvPicPr>
-          <p:cNvPr id="6" name="Picture 3" descr="D:\Daten\Programmierumgebungen\GameLab\Alien-Gruppe\HUD Elemente\AlienControls.png"/>
-          <p:cNvPicPr>
-            <a:picLocks noChangeAspect="1" noChangeArrowheads="1"/>
-          </p:cNvPicPr>
-          <p:nvPr/>
-        </p:nvPicPr>
-        <p:blipFill rotWithShape="1">
-          <a:blip r:embed="rId2">
-            <a:extLst>
-              <a:ext uri="{28A0092B-C50C-407E-A947-70E740481C1C}">
-                <a14:useLocalDpi xmlns:a14="http://schemas.microsoft.com/office/drawing/2010/main" val="0"/>
-              </a:ext>
-            </a:extLst>
-          </a:blip>
-          <a:srcRect t="25302"/>
-          <a:stretch/>
-        </p:blipFill>
-        <p:spPr bwMode="auto">
-          <a:xfrm>
-            <a:off x="6120172" y="3501008"/>
-            <a:ext cx="2232248" cy="2745583"/>
-          </a:xfrm>
-          <a:prstGeom prst="rect">
-            <a:avLst/>
-          </a:prstGeom>
-          <a:noFill/>
-          <a:extLst>
-            <a:ext uri="{909E8E84-426E-40DD-AFC4-6F175D3DCCD1}">
-              <a14:hiddenFill xmlns:a14="http://schemas.microsoft.com/office/drawing/2010/main">
-                <a:solidFill>
-                  <a:srgbClr val="FFFFFF"/>
-                </a:solidFill>
-              </a14:hiddenFill>
-            </a:ext>
-          </a:extLst>
-        </p:spPr>
-      </p:pic>
-      <p:pic>
-        <p:nvPicPr>
-          <p:cNvPr id="7" name="Picture 4" descr="D:\Daten\Programmierumgebungen\GameLab\Alien-Gruppe\HUD Elemente\AlienUebersicht.png"/>
-          <p:cNvPicPr>
-            <a:picLocks noChangeAspect="1" noChangeArrowheads="1"/>
-          </p:cNvPicPr>
-          <p:nvPr/>
-        </p:nvPicPr>
-        <p:blipFill rotWithShape="1">
-          <a:blip r:embed="rId3">
-            <a:extLst>
-              <a:ext uri="{28A0092B-C50C-407E-A947-70E740481C1C}">
-                <a14:useLocalDpi xmlns:a14="http://schemas.microsoft.com/office/drawing/2010/main" val="0"/>
-              </a:ext>
-            </a:extLst>
-          </a:blip>
-          <a:srcRect l="9043" t="14826" r="15640" b="51596"/>
-          <a:stretch/>
-        </p:blipFill>
-        <p:spPr bwMode="auto">
-          <a:xfrm>
-            <a:off x="971600" y="2444895"/>
-            <a:ext cx="1296144" cy="1235766"/>
-          </a:xfrm>
-          <a:prstGeom prst="rect">
-            <a:avLst/>
-          </a:prstGeom>
-          <a:noFill/>
-          <a:extLst>
-            <a:ext uri="{909E8E84-426E-40DD-AFC4-6F175D3DCCD1}">
-              <a14:hiddenFill xmlns:a14="http://schemas.microsoft.com/office/drawing/2010/main">
-                <a:solidFill>
-                  <a:srgbClr val="FFFFFF"/>
-                </a:solidFill>
-              </a14:hiddenFill>
-            </a:ext>
-          </a:extLst>
-        </p:spPr>
-      </p:pic>
-    </p:spTree>
-    <p:extLst>
-      <p:ext uri="{BB962C8B-B14F-4D97-AF65-F5344CB8AC3E}">
-        <p14:creationId xmlns:p14="http://schemas.microsoft.com/office/powerpoint/2010/main" val="2907211629"/>
-      </p:ext>
-    </p:extLst>
-  </p:cSld>
-  <p:clrMapOvr>
-    <a:masterClrMapping/>
-  </p:clrMapOvr>
-</p:sld>
-</file>
-
-<file path=ppt/slides/slide19.xml><?xml version="1.0" encoding="utf-8"?>
-<p:sld xmlns:a="http://schemas.openxmlformats.org/drawingml/2006/main" xmlns:r="http://schemas.openxmlformats.org/officeDocument/2006/relationships" xmlns:p="http://schemas.openxmlformats.org/presentationml/2006/main">
-  <p:cSld>
-    <p:spTree>
-      <p:nvGrpSpPr>
-        <p:cNvPr id="1" name=""/>
-        <p:cNvGrpSpPr/>
-        <p:nvPr/>
-      </p:nvGrpSpPr>
-      <p:grpSpPr>
-        <a:xfrm>
-          <a:off x="0" y="0"/>
-          <a:ext cx="0" cy="0"/>
-          <a:chOff x="0" y="0"/>
-          <a:chExt cx="0" cy="0"/>
-        </a:xfrm>
-      </p:grpSpPr>
-      <p:sp>
-        <p:nvSpPr>
-          <p:cNvPr id="2" name="Title 1"/>
-          <p:cNvSpPr>
-            <a:spLocks noGrp="1"/>
-          </p:cNvSpPr>
-          <p:nvPr>
-            <p:ph type="title"/>
-          </p:nvPr>
-        </p:nvSpPr>
-        <p:spPr>
-          <a:xfrm>
-            <a:off x="457200" y="274638"/>
-            <a:ext cx="8229600" cy="1143000"/>
-          </a:xfrm>
-        </p:spPr>
-        <p:txBody>
-          <a:bodyPr/>
-          <a:lstStyle/>
-          <a:p>
-            <a:r>
-              <a:rPr lang="de-DE" dirty="0" smtClean="0"/>
-              <a:t>Alien: Steuerelemente</a:t>
-            </a:r>
-            <a:endParaRPr lang="en-US" dirty="0"/>
-          </a:p>
-        </p:txBody>
-      </p:sp>
-      <p:sp>
-        <p:nvSpPr>
-          <p:cNvPr id="3" name="Content Placeholder 2"/>
-          <p:cNvSpPr>
-            <a:spLocks noGrp="1"/>
-          </p:cNvSpPr>
-          <p:nvPr>
-            <p:ph idx="1"/>
-          </p:nvPr>
-        </p:nvSpPr>
-        <p:spPr>
-          <a:xfrm>
-            <a:off x="457200" y="1600200"/>
-            <a:ext cx="8229600" cy="4637112"/>
-          </a:xfrm>
-        </p:spPr>
-        <p:txBody>
-          <a:bodyPr>
-            <a:normAutofit fontScale="85000" lnSpcReduction="20000"/>
-          </a:bodyPr>
-          <a:lstStyle/>
-          <a:p>
-            <a:r>
-              <a:rPr lang="de-DE" dirty="0" smtClean="0"/>
-              <a:t>Wenn </a:t>
-            </a:r>
-            <a:r>
-              <a:rPr lang="de-DE" dirty="0" err="1" smtClean="0"/>
-              <a:t>AlienSpawner</a:t>
-            </a:r>
-            <a:r>
-              <a:rPr lang="de-DE" dirty="0" smtClean="0"/>
-              <a:t> ausgewählt wurde, wird eine Eingabemöglichkeit (</a:t>
-            </a:r>
-            <a:r>
-              <a:rPr lang="de-DE" dirty="0" err="1" smtClean="0"/>
-              <a:t>NumPad</a:t>
-            </a:r>
-            <a:r>
-              <a:rPr lang="de-DE" dirty="0" smtClean="0"/>
-              <a:t>) auf der rechten Seite angezeigt:</a:t>
-            </a:r>
-          </a:p>
-          <a:p>
-            <a:pPr lvl="1"/>
-            <a:r>
-              <a:rPr lang="de-DE" dirty="0" smtClean="0"/>
-              <a:t>Zahlen (0 – 9)</a:t>
-            </a:r>
-          </a:p>
-          <a:p>
-            <a:pPr lvl="1"/>
-            <a:r>
-              <a:rPr lang="de-DE" dirty="0" smtClean="0"/>
-              <a:t>Eingabe löschen (C)</a:t>
-            </a:r>
-          </a:p>
-          <a:p>
-            <a:pPr lvl="1"/>
-            <a:r>
-              <a:rPr lang="de-DE" dirty="0" smtClean="0"/>
-              <a:t>Eingabe bestätigen (E)</a:t>
-            </a:r>
-            <a:endParaRPr lang="de-DE" dirty="0"/>
-          </a:p>
-          <a:p>
-            <a:endParaRPr lang="en-US" dirty="0" smtClean="0"/>
-          </a:p>
-          <a:p>
-            <a:pPr marL="0" indent="0">
-              <a:buNone/>
-            </a:pPr>
-            <a:endParaRPr lang="en-US" dirty="0"/>
-          </a:p>
-          <a:p>
-            <a:pPr marL="0" indent="0">
-              <a:buNone/>
-            </a:pPr>
-            <a:endParaRPr lang="en-US" dirty="0" smtClean="0"/>
-          </a:p>
-          <a:p>
-            <a:pPr marL="0" indent="0">
-              <a:buNone/>
-            </a:pPr>
-            <a:endParaRPr lang="en-US" dirty="0"/>
-          </a:p>
-          <a:p>
-            <a:r>
-              <a:rPr lang="en-US" dirty="0" err="1" smtClean="0"/>
-              <a:t>Wenn</a:t>
-            </a:r>
-            <a:r>
-              <a:rPr lang="en-US" dirty="0" smtClean="0"/>
-              <a:t> Alien und </a:t>
-            </a:r>
-            <a:r>
-              <a:rPr lang="en-US" dirty="0" err="1" smtClean="0"/>
-              <a:t>AlienSpawner</a:t>
-            </a:r>
-            <a:r>
-              <a:rPr lang="en-US" dirty="0" smtClean="0"/>
-              <a:t> </a:t>
-            </a:r>
-            <a:r>
-              <a:rPr lang="en-US" dirty="0" err="1" smtClean="0"/>
-              <a:t>gleichtzeitig</a:t>
-            </a:r>
-            <a:r>
-              <a:rPr lang="en-US" dirty="0" smtClean="0"/>
-              <a:t> </a:t>
-            </a:r>
-            <a:r>
-              <a:rPr lang="en-US" dirty="0" err="1" smtClean="0"/>
-              <a:t>ausgewählt</a:t>
-            </a:r>
-            <a:r>
-              <a:rPr lang="en-US" dirty="0" smtClean="0"/>
-              <a:t> </a:t>
-            </a:r>
-            <a:r>
-              <a:rPr lang="en-US" dirty="0" err="1" smtClean="0"/>
-              <a:t>wurden</a:t>
-            </a:r>
-            <a:r>
-              <a:rPr lang="en-US" dirty="0" smtClean="0"/>
-              <a:t>, </a:t>
-            </a:r>
-            <a:r>
-              <a:rPr lang="en-US" dirty="0" err="1" smtClean="0"/>
-              <a:t>wird</a:t>
-            </a:r>
-            <a:r>
-              <a:rPr lang="en-US" dirty="0" smtClean="0"/>
-              <a:t> das Alien </a:t>
-            </a:r>
-            <a:r>
-              <a:rPr lang="en-US" dirty="0" err="1" smtClean="0"/>
-              <a:t>bevorzugt</a:t>
-            </a:r>
-            <a:r>
-              <a:rPr lang="en-US" dirty="0" smtClean="0"/>
-              <a:t>.</a:t>
-            </a:r>
-            <a:endParaRPr lang="en-US" dirty="0"/>
-          </a:p>
-        </p:txBody>
-      </p:sp>
-      <p:sp>
-        <p:nvSpPr>
-          <p:cNvPr id="4" name="Footer Placeholder 3"/>
-          <p:cNvSpPr>
-            <a:spLocks noGrp="1"/>
-          </p:cNvSpPr>
-          <p:nvPr>
-            <p:ph type="ftr" sz="quarter" idx="11"/>
-          </p:nvPr>
-        </p:nvSpPr>
-        <p:spPr>
-          <a:xfrm>
-            <a:off x="3124200" y="6356350"/>
-            <a:ext cx="2895600" cy="365125"/>
-          </a:xfrm>
-        </p:spPr>
-        <p:txBody>
-          <a:bodyPr/>
-          <a:lstStyle/>
-          <a:p>
-            <a:r>
-              <a:rPr lang="en-US" smtClean="0"/>
-              <a:t>Projektseminar GameLab 2014</a:t>
-            </a:r>
-            <a:endParaRPr lang="en-US"/>
-          </a:p>
-        </p:txBody>
-      </p:sp>
-      <p:sp>
-        <p:nvSpPr>
-          <p:cNvPr id="5" name="Slide Number Placeholder 4"/>
-          <p:cNvSpPr>
-            <a:spLocks noGrp="1"/>
-          </p:cNvSpPr>
-          <p:nvPr>
-            <p:ph type="sldNum" sz="quarter" idx="12"/>
-          </p:nvPr>
-        </p:nvSpPr>
-        <p:spPr>
-          <a:xfrm>
-            <a:off x="6553200" y="6356350"/>
-            <a:ext cx="2133600" cy="365125"/>
-          </a:xfrm>
-        </p:spPr>
-        <p:txBody>
-          <a:bodyPr/>
-          <a:lstStyle/>
-          <a:p>
-            <a:fld id="{6745021C-5F18-4753-8082-8C4943AC116D}" type="slidenum">
-              <a:rPr lang="en-US" smtClean="0"/>
-              <a:pPr/>
-              <a:t>19</a:t>
-            </a:fld>
-            <a:endParaRPr lang="en-US"/>
-          </a:p>
-        </p:txBody>
-      </p:sp>
-      <p:pic>
-        <p:nvPicPr>
-          <p:cNvPr id="6" name="Picture 6" descr="D:\Daten\Programmierumgebungen\GameLab\Alien-Gruppe\HUD Elemente\Numpad.png"/>
-          <p:cNvPicPr>
-            <a:picLocks noChangeAspect="1" noChangeArrowheads="1"/>
-          </p:cNvPicPr>
-          <p:nvPr/>
-        </p:nvPicPr>
-        <p:blipFill rotWithShape="1">
-          <a:blip r:embed="rId2">
-            <a:extLst>
-              <a:ext uri="{28A0092B-C50C-407E-A947-70E740481C1C}">
-                <a14:useLocalDpi xmlns:a14="http://schemas.microsoft.com/office/drawing/2010/main" val="0"/>
-              </a:ext>
-            </a:extLst>
-          </a:blip>
-          <a:srcRect l="15847" t="35341" r="69" b="23895"/>
-          <a:stretch/>
-        </p:blipFill>
-        <p:spPr bwMode="auto">
-          <a:xfrm>
-            <a:off x="6084168" y="2420888"/>
-            <a:ext cx="2448272" cy="2558143"/>
-          </a:xfrm>
-          <a:prstGeom prst="rect">
-            <a:avLst/>
-          </a:prstGeom>
-          <a:noFill/>
-          <a:extLst>
-            <a:ext uri="{909E8E84-426E-40DD-AFC4-6F175D3DCCD1}">
-              <a14:hiddenFill xmlns:a14="http://schemas.microsoft.com/office/drawing/2010/main">
-                <a:solidFill>
-                  <a:srgbClr val="FFFFFF"/>
-                </a:solidFill>
-              </a14:hiddenFill>
-            </a:ext>
-          </a:extLst>
-        </p:spPr>
-      </p:pic>
-    </p:spTree>
-    <p:extLst>
-      <p:ext uri="{BB962C8B-B14F-4D97-AF65-F5344CB8AC3E}">
-        <p14:creationId xmlns:p14="http://schemas.microsoft.com/office/powerpoint/2010/main" val="3966542943"/>
-      </p:ext>
-    </p:extLst>
-  </p:cSld>
-  <p:clrMapOvr>
-    <a:masterClrMapping/>
-  </p:clrMapOvr>
-</p:sld>
-</file>
-
 <file path=ppt/slides/slide2.xml><?xml version="1.0" encoding="utf-8"?>
 <p:sld xmlns:a="http://schemas.openxmlformats.org/drawingml/2006/main" xmlns:r="http://schemas.openxmlformats.org/officeDocument/2006/relationships" xmlns:p="http://schemas.openxmlformats.org/presentationml/2006/main">
   <p:cSld>
@@ -6503,394 +4971,6 @@
       </p:par>
     </p:tnLst>
   </p:timing>
-</p:sld>
-</file>
-
-<file path=ppt/slides/slide20.xml><?xml version="1.0" encoding="utf-8"?>
-<p:sld xmlns:a="http://schemas.openxmlformats.org/drawingml/2006/main" xmlns:r="http://schemas.openxmlformats.org/officeDocument/2006/relationships" xmlns:p="http://schemas.openxmlformats.org/presentationml/2006/main">
-  <p:cSld>
-    <p:spTree>
-      <p:nvGrpSpPr>
-        <p:cNvPr id="1" name=""/>
-        <p:cNvGrpSpPr/>
-        <p:nvPr/>
-      </p:nvGrpSpPr>
-      <p:grpSpPr>
-        <a:xfrm>
-          <a:off x="0" y="0"/>
-          <a:ext cx="0" cy="0"/>
-          <a:chOff x="0" y="0"/>
-          <a:chExt cx="0" cy="0"/>
-        </a:xfrm>
-      </p:grpSpPr>
-      <p:sp>
-        <p:nvSpPr>
-          <p:cNvPr id="2" name="Title 1"/>
-          <p:cNvSpPr>
-            <a:spLocks noGrp="1"/>
-          </p:cNvSpPr>
-          <p:nvPr>
-            <p:ph type="title"/>
-          </p:nvPr>
-        </p:nvSpPr>
-        <p:spPr>
-          <a:xfrm>
-            <a:off x="457200" y="274638"/>
-            <a:ext cx="8229600" cy="1143000"/>
-          </a:xfrm>
-        </p:spPr>
-        <p:txBody>
-          <a:bodyPr>
-            <a:normAutofit/>
-          </a:bodyPr>
-          <a:lstStyle/>
-          <a:p>
-            <a:r>
-              <a:rPr lang="de-DE" dirty="0" smtClean="0"/>
-              <a:t>Alien: Große Mini-</a:t>
-            </a:r>
-            <a:r>
-              <a:rPr lang="de-DE" dirty="0" err="1" smtClean="0"/>
-              <a:t>Map</a:t>
-            </a:r>
-            <a:endParaRPr lang="en-US" dirty="0"/>
-          </a:p>
-        </p:txBody>
-      </p:sp>
-      <p:sp>
-        <p:nvSpPr>
-          <p:cNvPr id="3" name="Content Placeholder 2"/>
-          <p:cNvSpPr>
-            <a:spLocks noGrp="1"/>
-          </p:cNvSpPr>
-          <p:nvPr>
-            <p:ph idx="1"/>
-          </p:nvPr>
-        </p:nvSpPr>
-        <p:spPr>
-          <a:xfrm>
-            <a:off x="457200" y="1600200"/>
-            <a:ext cx="5770984" cy="4525963"/>
-          </a:xfrm>
-        </p:spPr>
-        <p:txBody>
-          <a:bodyPr>
-            <a:normAutofit/>
-          </a:bodyPr>
-          <a:lstStyle/>
-          <a:p>
-            <a:r>
-              <a:rPr lang="de-DE" dirty="0" smtClean="0"/>
-              <a:t>Steuerung sowohl über Gesten,</a:t>
-            </a:r>
-          </a:p>
-          <a:p>
-            <a:pPr marL="457200" lvl="1" indent="0">
-              <a:buNone/>
-            </a:pPr>
-            <a:r>
-              <a:rPr lang="de-DE" dirty="0" smtClean="0"/>
-              <a:t>als auch über Buttons möglich:</a:t>
-            </a:r>
-          </a:p>
-          <a:p>
-            <a:pPr lvl="1"/>
-            <a:r>
-              <a:rPr lang="de-DE" dirty="0" smtClean="0"/>
-              <a:t>Schließen</a:t>
-            </a:r>
-          </a:p>
-          <a:p>
-            <a:pPr lvl="1"/>
-            <a:r>
-              <a:rPr lang="de-DE" dirty="0" smtClean="0"/>
-              <a:t>Raum auswählen (entweder Mouse-Click oder Touch-Klick), dann</a:t>
-            </a:r>
-          </a:p>
-          <a:p>
-            <a:pPr lvl="2"/>
-            <a:r>
-              <a:rPr lang="de-DE" dirty="0" smtClean="0"/>
-              <a:t>Rotieren (Im Uhrzeiger-/ Gegenuhrzeigersinn)</a:t>
-            </a:r>
-          </a:p>
-          <a:p>
-            <a:pPr lvl="2"/>
-            <a:r>
-              <a:rPr lang="de-DE" dirty="0" smtClean="0"/>
-              <a:t>Strom ausschalten</a:t>
-            </a:r>
-          </a:p>
-        </p:txBody>
-      </p:sp>
-      <p:sp>
-        <p:nvSpPr>
-          <p:cNvPr id="4" name="Footer Placeholder 3"/>
-          <p:cNvSpPr>
-            <a:spLocks noGrp="1"/>
-          </p:cNvSpPr>
-          <p:nvPr>
-            <p:ph type="ftr" sz="quarter" idx="11"/>
-          </p:nvPr>
-        </p:nvSpPr>
-        <p:spPr>
-          <a:xfrm>
-            <a:off x="3124200" y="6356350"/>
-            <a:ext cx="2895600" cy="365125"/>
-          </a:xfrm>
-        </p:spPr>
-        <p:txBody>
-          <a:bodyPr/>
-          <a:lstStyle/>
-          <a:p>
-            <a:r>
-              <a:rPr lang="en-US" smtClean="0"/>
-              <a:t>Projektseminar GameLab 2014</a:t>
-            </a:r>
-            <a:endParaRPr lang="en-US"/>
-          </a:p>
-        </p:txBody>
-      </p:sp>
-      <p:sp>
-        <p:nvSpPr>
-          <p:cNvPr id="5" name="Slide Number Placeholder 4"/>
-          <p:cNvSpPr>
-            <a:spLocks noGrp="1"/>
-          </p:cNvSpPr>
-          <p:nvPr>
-            <p:ph type="sldNum" sz="quarter" idx="12"/>
-          </p:nvPr>
-        </p:nvSpPr>
-        <p:spPr>
-          <a:xfrm>
-            <a:off x="6553200" y="6356350"/>
-            <a:ext cx="2133600" cy="365125"/>
-          </a:xfrm>
-        </p:spPr>
-        <p:txBody>
-          <a:bodyPr/>
-          <a:lstStyle/>
-          <a:p>
-            <a:fld id="{6745021C-5F18-4753-8082-8C4943AC116D}" type="slidenum">
-              <a:rPr lang="en-US" smtClean="0"/>
-              <a:pPr/>
-              <a:t>20</a:t>
-            </a:fld>
-            <a:endParaRPr lang="en-US"/>
-          </a:p>
-        </p:txBody>
-      </p:sp>
-      <p:pic>
-        <p:nvPicPr>
-          <p:cNvPr id="6" name="Picture 2" descr="D:\Daten\Programmierumgebungen\GameLab\Alien-Gruppe\HUD Elemente\BigMinimap.png"/>
-          <p:cNvPicPr>
-            <a:picLocks noChangeAspect="1" noChangeArrowheads="1"/>
-          </p:cNvPicPr>
-          <p:nvPr/>
-        </p:nvPicPr>
-        <p:blipFill>
-          <a:blip r:embed="rId2" cstate="print">
-            <a:extLst>
-              <a:ext uri="{28A0092B-C50C-407E-A947-70E740481C1C}">
-                <a14:useLocalDpi xmlns:a14="http://schemas.microsoft.com/office/drawing/2010/main" val="0"/>
-              </a:ext>
-            </a:extLst>
-          </a:blip>
-          <a:srcRect/>
-          <a:stretch>
-            <a:fillRect/>
-          </a:stretch>
-        </p:blipFill>
-        <p:spPr bwMode="auto">
-          <a:xfrm>
-            <a:off x="5868144" y="2348880"/>
-            <a:ext cx="3089945" cy="2496768"/>
-          </a:xfrm>
-          <a:prstGeom prst="rect">
-            <a:avLst/>
-          </a:prstGeom>
-          <a:noFill/>
-          <a:extLst>
-            <a:ext uri="{909E8E84-426E-40DD-AFC4-6F175D3DCCD1}">
-              <a14:hiddenFill xmlns:a14="http://schemas.microsoft.com/office/drawing/2010/main">
-                <a:solidFill>
-                  <a:srgbClr val="FFFFFF"/>
-                </a:solidFill>
-              </a14:hiddenFill>
-            </a:ext>
-          </a:extLst>
-        </p:spPr>
-      </p:pic>
-    </p:spTree>
-    <p:extLst>
-      <p:ext uri="{BB962C8B-B14F-4D97-AF65-F5344CB8AC3E}">
-        <p14:creationId xmlns:p14="http://schemas.microsoft.com/office/powerpoint/2010/main" val="554962746"/>
-      </p:ext>
-    </p:extLst>
-  </p:cSld>
-  <p:clrMapOvr>
-    <a:masterClrMapping/>
-  </p:clrMapOvr>
-</p:sld>
-</file>
-
-<file path=ppt/slides/slide21.xml><?xml version="1.0" encoding="utf-8"?>
-<p:sld xmlns:a="http://schemas.openxmlformats.org/drawingml/2006/main" xmlns:r="http://schemas.openxmlformats.org/officeDocument/2006/relationships" xmlns:p="http://schemas.openxmlformats.org/presentationml/2006/main">
-  <p:cSld>
-    <p:spTree>
-      <p:nvGrpSpPr>
-        <p:cNvPr id="1" name=""/>
-        <p:cNvGrpSpPr/>
-        <p:nvPr/>
-      </p:nvGrpSpPr>
-      <p:grpSpPr>
-        <a:xfrm>
-          <a:off x="0" y="0"/>
-          <a:ext cx="0" cy="0"/>
-          <a:chOff x="0" y="0"/>
-          <a:chExt cx="0" cy="0"/>
-        </a:xfrm>
-      </p:grpSpPr>
-      <p:sp>
-        <p:nvSpPr>
-          <p:cNvPr id="2" name="Title 1"/>
-          <p:cNvSpPr>
-            <a:spLocks noGrp="1"/>
-          </p:cNvSpPr>
-          <p:nvPr>
-            <p:ph type="title"/>
-          </p:nvPr>
-        </p:nvSpPr>
-        <p:spPr>
-          <a:xfrm>
-            <a:off x="457200" y="274638"/>
-            <a:ext cx="8229600" cy="1143000"/>
-          </a:xfrm>
-        </p:spPr>
-        <p:txBody>
-          <a:bodyPr>
-            <a:normAutofit/>
-          </a:bodyPr>
-          <a:lstStyle/>
-          <a:p>
-            <a:r>
-              <a:rPr lang="de-DE" dirty="0" smtClean="0"/>
-              <a:t>Gesten: Mini-</a:t>
-            </a:r>
-            <a:r>
-              <a:rPr lang="de-DE" dirty="0" err="1" smtClean="0"/>
-              <a:t>Map</a:t>
-            </a:r>
-            <a:endParaRPr lang="en-US" dirty="0"/>
-          </a:p>
-        </p:txBody>
-      </p:sp>
-      <p:sp>
-        <p:nvSpPr>
-          <p:cNvPr id="3" name="Footer Placeholder 3"/>
-          <p:cNvSpPr>
-            <a:spLocks noGrp="1"/>
-          </p:cNvSpPr>
-          <p:nvPr>
-            <p:ph type="ftr" sz="quarter" idx="11"/>
-          </p:nvPr>
-        </p:nvSpPr>
-        <p:spPr>
-          <a:xfrm>
-            <a:off x="3124200" y="6356350"/>
-            <a:ext cx="2895600" cy="365125"/>
-          </a:xfrm>
-        </p:spPr>
-        <p:txBody>
-          <a:bodyPr/>
-          <a:lstStyle/>
-          <a:p>
-            <a:r>
-              <a:rPr lang="en-US" smtClean="0"/>
-              <a:t>Projektseminar GameLab 2014</a:t>
-            </a:r>
-            <a:endParaRPr lang="en-US"/>
-          </a:p>
-        </p:txBody>
-      </p:sp>
-      <p:sp>
-        <p:nvSpPr>
-          <p:cNvPr id="4" name="Slide Number Placeholder 4"/>
-          <p:cNvSpPr>
-            <a:spLocks noGrp="1"/>
-          </p:cNvSpPr>
-          <p:nvPr>
-            <p:ph type="sldNum" sz="quarter" idx="12"/>
-          </p:nvPr>
-        </p:nvSpPr>
-        <p:spPr>
-          <a:xfrm>
-            <a:off x="6553200" y="6356350"/>
-            <a:ext cx="2133600" cy="365125"/>
-          </a:xfrm>
-        </p:spPr>
-        <p:txBody>
-          <a:bodyPr/>
-          <a:lstStyle/>
-          <a:p>
-            <a:fld id="{6745021C-5F18-4753-8082-8C4943AC116D}" type="slidenum">
-              <a:rPr lang="en-US" smtClean="0"/>
-              <a:pPr/>
-              <a:t>21</a:t>
-            </a:fld>
-            <a:endParaRPr lang="en-US"/>
-          </a:p>
-        </p:txBody>
-      </p:sp>
-      <p:pic>
-        <p:nvPicPr>
-          <p:cNvPr id="5" name="Picture 3" descr="D:\Daten\Programmierumgebungen\GameLab\Alien-Gruppe\HUD Elemente\GestenMinimap.png"/>
-          <p:cNvPicPr>
-            <a:picLocks noChangeAspect="1" noChangeArrowheads="1"/>
-          </p:cNvPicPr>
-          <p:nvPr/>
-        </p:nvPicPr>
-        <p:blipFill rotWithShape="1">
-          <a:blip r:embed="rId2">
-            <a:extLst>
-              <a:ext uri="{28A0092B-C50C-407E-A947-70E740481C1C}">
-                <a14:useLocalDpi xmlns:a14="http://schemas.microsoft.com/office/drawing/2010/main" val="0"/>
-              </a:ext>
-            </a:extLst>
-          </a:blip>
-          <a:srcRect l="6329" t="28835" r="19459" b="9594"/>
-          <a:stretch/>
-        </p:blipFill>
-        <p:spPr bwMode="auto">
-          <a:xfrm>
-            <a:off x="2411760" y="1988840"/>
-            <a:ext cx="4320480" cy="4040567"/>
-          </a:xfrm>
-          <a:prstGeom prst="rect">
-            <a:avLst/>
-          </a:prstGeom>
-          <a:noFill/>
-          <a:extLst>
-            <a:ext uri="{909E8E84-426E-40DD-AFC4-6F175D3DCCD1}">
-              <a14:hiddenFill xmlns:a14="http://schemas.microsoft.com/office/drawing/2010/main">
-                <a:solidFill>
-                  <a:srgbClr val="FFFFFF"/>
-                </a:solidFill>
-              </a14:hiddenFill>
-            </a:ext>
-          </a:extLst>
-        </p:spPr>
-      </p:pic>
-    </p:spTree>
-    <p:extLst>
-      <p:ext uri="{BB962C8B-B14F-4D97-AF65-F5344CB8AC3E}">
-        <p14:creationId xmlns:p14="http://schemas.microsoft.com/office/powerpoint/2010/main" val="4141963266"/>
-      </p:ext>
-    </p:extLst>
-  </p:cSld>
-  <p:clrMapOvr>
-    <a:masterClrMapping/>
-  </p:clrMapOvr>
 </p:sld>
 </file>
 
@@ -7640,15 +5720,7 @@
             <a:pPr lvl="1"/>
             <a:r>
               <a:rPr lang="de-DE" dirty="0" smtClean="0"/>
-              <a:t>Erkunden</a:t>
-            </a:r>
-            <a:r>
-              <a:rPr lang="de-DE" dirty="0" smtClean="0"/>
-              <a:t> </a:t>
-            </a:r>
-            <a:r>
-              <a:rPr lang="de-DE" dirty="0" smtClean="0"/>
-              <a:t>die Raumstation</a:t>
+              <a:t>Erkunden die Raumstation</a:t>
             </a:r>
           </a:p>
           <a:p>
@@ -7687,15 +5759,7 @@
             <a:pPr lvl="1"/>
             <a:r>
               <a:rPr lang="de-DE" dirty="0" smtClean="0"/>
-              <a:t>Steuerung: </a:t>
-            </a:r>
-            <a:r>
-              <a:rPr lang="de-DE" dirty="0" smtClean="0"/>
-              <a:t>Beamer (Cave) und </a:t>
-            </a:r>
-            <a:r>
-              <a:rPr lang="de-DE" dirty="0" smtClean="0"/>
-              <a:t>Oculus mit der Wiimote</a:t>
+              <a:t>Steuerung: Beamer (Cave) und Oculus mit der Wiimote</a:t>
             </a:r>
           </a:p>
           <a:p>
@@ -7875,11 +5939,19 @@
           <a:p>
             <a:pPr lvl="2"/>
             <a:r>
-              <a:rPr lang="de-DE" dirty="0"/>
+              <a:rPr lang="de-DE" dirty="0">
+                <a:solidFill>
+                  <a:srgbClr val="FF0000"/>
+                </a:solidFill>
+              </a:rPr>
               <a:t>p</a:t>
             </a:r>
             <a:r>
-              <a:rPr lang="de-DE" dirty="0" smtClean="0"/>
+              <a:rPr lang="de-DE" dirty="0" smtClean="0">
+                <a:solidFill>
+                  <a:srgbClr val="FF0000"/>
+                </a:solidFill>
+              </a:rPr>
               <a:t>assiv / aktiv</a:t>
             </a:r>
           </a:p>
@@ -8099,7 +6171,6 @@
               <a:rPr lang="de-DE" dirty="0" smtClean="0"/>
               <a:t>Statistik</a:t>
             </a:r>
-            <a:endParaRPr lang="de-DE" dirty="0" smtClean="0"/>
           </a:p>
         </p:txBody>
       </p:sp>

</xml_diff>